<commit_message>
Atualizado ppt aula 2
</commit_message>
<xml_diff>
--- a/arquivos-treinamento/Treinamento Automação CWI - Aula 2.pptx
+++ b/arquivos-treinamento/Treinamento Automação CWI - Aula 2.pptx
@@ -5,7 +5,7 @@
     <p:sldMasterId id="2147483648" r:id="rId1"/>
   </p:sldMasterIdLst>
   <p:notesMasterIdLst>
-    <p:notesMasterId r:id="rId49"/>
+    <p:notesMasterId r:id="rId50"/>
   </p:notesMasterIdLst>
   <p:sldIdLst>
     <p:sldId id="277" r:id="rId2"/>
@@ -35,26 +35,27 @@
     <p:sldId id="381" r:id="rId26"/>
     <p:sldId id="348" r:id="rId27"/>
     <p:sldId id="359" r:id="rId28"/>
-    <p:sldId id="357" r:id="rId29"/>
-    <p:sldId id="362" r:id="rId30"/>
-    <p:sldId id="363" r:id="rId31"/>
-    <p:sldId id="364" r:id="rId32"/>
-    <p:sldId id="365" r:id="rId33"/>
-    <p:sldId id="366" r:id="rId34"/>
-    <p:sldId id="369" r:id="rId35"/>
-    <p:sldId id="356" r:id="rId36"/>
-    <p:sldId id="368" r:id="rId37"/>
-    <p:sldId id="350" r:id="rId38"/>
-    <p:sldId id="375" r:id="rId39"/>
-    <p:sldId id="351" r:id="rId40"/>
-    <p:sldId id="373" r:id="rId41"/>
-    <p:sldId id="372" r:id="rId42"/>
-    <p:sldId id="374" r:id="rId43"/>
-    <p:sldId id="371" r:id="rId44"/>
-    <p:sldId id="352" r:id="rId45"/>
-    <p:sldId id="376" r:id="rId46"/>
-    <p:sldId id="321" r:id="rId47"/>
-    <p:sldId id="274" r:id="rId48"/>
+    <p:sldId id="402" r:id="rId29"/>
+    <p:sldId id="357" r:id="rId30"/>
+    <p:sldId id="362" r:id="rId31"/>
+    <p:sldId id="363" r:id="rId32"/>
+    <p:sldId id="364" r:id="rId33"/>
+    <p:sldId id="365" r:id="rId34"/>
+    <p:sldId id="366" r:id="rId35"/>
+    <p:sldId id="369" r:id="rId36"/>
+    <p:sldId id="356" r:id="rId37"/>
+    <p:sldId id="368" r:id="rId38"/>
+    <p:sldId id="350" r:id="rId39"/>
+    <p:sldId id="375" r:id="rId40"/>
+    <p:sldId id="351" r:id="rId41"/>
+    <p:sldId id="373" r:id="rId42"/>
+    <p:sldId id="372" r:id="rId43"/>
+    <p:sldId id="374" r:id="rId44"/>
+    <p:sldId id="371" r:id="rId45"/>
+    <p:sldId id="352" r:id="rId46"/>
+    <p:sldId id="376" r:id="rId47"/>
+    <p:sldId id="321" r:id="rId48"/>
+    <p:sldId id="274" r:id="rId49"/>
   </p:sldIdLst>
   <p:sldSz cx="12192000" cy="6858000"/>
   <p:notesSz cx="6858000" cy="9144000"/>
@@ -2389,18 +2390,7 @@
                 </a:solidFill>
                 <a:latin typeface="Arial Black" panose="020B0A04020102020204" pitchFamily="34" charset="0"/>
               </a:rPr>
-              <a:t>0.4</a:t>
-            </a:r>
-            <a:r>
-              <a:rPr lang="pt-BR" sz="2400" dirty="0" smtClean="0">
-                <a:solidFill>
-                  <a:schemeClr val="bg1">
-                    <a:lumMod val="65000"/>
-                  </a:schemeClr>
-                </a:solidFill>
-                <a:latin typeface="Arial Black" panose="020B0A04020102020204" pitchFamily="34" charset="0"/>
-              </a:rPr>
-              <a:t>.</a:t>
+              <a:t>0.4.</a:t>
             </a:r>
             <a:r>
               <a:rPr lang="pt-BR" sz="2200" dirty="0" smtClean="0">
@@ -6891,7 +6881,12 @@
             <p:ph type="ctrTitle"/>
           </p:nvPr>
         </p:nvSpPr>
-        <p:spPr/>
+        <p:spPr>
+          <a:xfrm>
+            <a:off x="5245770" y="2530642"/>
+            <a:ext cx="6448247" cy="1740567"/>
+          </a:xfrm>
+        </p:spPr>
         <p:txBody>
           <a:bodyPr>
             <a:normAutofit/>
@@ -6985,13 +6980,22 @@
               <a:t> </a:t>
             </a:r>
             <a:r>
+              <a:rPr lang="pt-BR" dirty="0" smtClean="0">
+                <a:solidFill>
+                  <a:schemeClr val="bg1"/>
+                </a:solidFill>
+                <a:latin typeface="Arial Black" panose="020B0A04020102020204" pitchFamily="34" charset="0"/>
+              </a:rPr>
+              <a:t>C     </a:t>
+            </a:r>
+            <a:r>
               <a:rPr lang="pt-BR" dirty="0" err="1" smtClean="0">
                 <a:solidFill>
                   <a:schemeClr val="bg1"/>
                 </a:solidFill>
                 <a:latin typeface="Arial Black" panose="020B0A04020102020204" pitchFamily="34" charset="0"/>
               </a:rPr>
-              <a:t>Cucumber</a:t>
+              <a:t>ucumber</a:t>
             </a:r>
             <a:endParaRPr lang="pt-BR" dirty="0">
               <a:solidFill>
@@ -7009,7 +7013,7 @@
         </p:nvSpPr>
         <p:spPr>
           <a:xfrm>
-            <a:off x="9075821" y="3103808"/>
+            <a:off x="8157298" y="3116687"/>
             <a:ext cx="3355435" cy="1021687"/>
           </a:xfrm>
           <a:prstGeom prst="rect">
@@ -7084,7 +7088,7 @@
           <a:p>
             <a:r>
               <a:rPr lang="pt-BR" dirty="0" err="1" smtClean="0"/>
-              <a:t>Tags</a:t>
+              <a:t>Feature</a:t>
             </a:r>
             <a:endParaRPr lang="pt-BR" b="0" dirty="0">
               <a:solidFill>
@@ -7094,39 +7098,9 @@
           </a:p>
         </p:txBody>
       </p:sp>
-      <p:sp>
-        <p:nvSpPr>
-          <p:cNvPr id="5" name="Espaço Reservado para Conteúdo 4"/>
-          <p:cNvSpPr>
-            <a:spLocks noGrp="1"/>
-          </p:cNvSpPr>
-          <p:nvPr>
-            <p:ph sz="half" idx="1"/>
-          </p:nvPr>
-        </p:nvSpPr>
-        <p:spPr>
-          <a:xfrm>
-            <a:off x="464714" y="1825625"/>
-            <a:ext cx="11216424" cy="1278183"/>
-          </a:xfrm>
-        </p:spPr>
-        <p:txBody>
-          <a:bodyPr>
-            <a:normAutofit/>
-          </a:bodyPr>
-          <a:lstStyle/>
-          <a:p>
-            <a:r>
-              <a:rPr lang="pt-BR" dirty="0" smtClean="0"/>
-              <a:t>Utilizado para agrupar cenários e criar suítes de teste</a:t>
-            </a:r>
-            <a:endParaRPr lang="pt-BR" dirty="0"/>
-          </a:p>
-        </p:txBody>
-      </p:sp>
       <p:pic>
         <p:nvPicPr>
-          <p:cNvPr id="3" name="Imagem 2"/>
+          <p:cNvPr id="9" name="Imagem 8"/>
           <p:cNvPicPr>
             <a:picLocks noChangeAspect="1"/>
           </p:cNvPicPr>
@@ -7140,8 +7114,8 @@
         </p:blipFill>
         <p:spPr>
           <a:xfrm>
-            <a:off x="1824136" y="2575029"/>
-            <a:ext cx="9058512" cy="3330604"/>
+            <a:off x="2360449" y="2150774"/>
+            <a:ext cx="9414456" cy="4430332"/>
           </a:xfrm>
           <a:prstGeom prst="rect">
             <a:avLst/>
@@ -7160,93 +7134,34 @@
       </p:pic>
       <p:sp>
         <p:nvSpPr>
-          <p:cNvPr id="6" name="Retângulo 5"/>
+          <p:cNvPr id="10" name="Retângulo 9"/>
           <p:cNvSpPr/>
           <p:nvPr/>
         </p:nvSpPr>
         <p:spPr>
           <a:xfrm>
-            <a:off x="1931831" y="2626545"/>
-            <a:ext cx="2112135" cy="296960"/>
+            <a:off x="2360449" y="1520999"/>
+            <a:ext cx="4694683" cy="461665"/>
           </a:xfrm>
           <a:prstGeom prst="rect">
             <a:avLst/>
           </a:prstGeom>
-          <a:noFill/>
-          <a:ln>
-            <a:solidFill>
-              <a:srgbClr val="FF0000"/>
-            </a:solidFill>
-          </a:ln>
-        </p:spPr>
-        <p:style>
-          <a:lnRef idx="2">
-            <a:schemeClr val="accent1">
-              <a:shade val="50000"/>
-            </a:schemeClr>
-          </a:lnRef>
-          <a:fillRef idx="1">
-            <a:schemeClr val="accent1"/>
-          </a:fillRef>
-          <a:effectRef idx="0">
-            <a:schemeClr val="accent1"/>
-          </a:effectRef>
-          <a:fontRef idx="minor">
-            <a:schemeClr val="lt1"/>
-          </a:fontRef>
-        </p:style>
-        <p:txBody>
-          <a:bodyPr rtlCol="0" anchor="ctr"/>
+        </p:spPr>
+        <p:txBody>
+          <a:bodyPr wrap="none">
+            <a:spAutoFit/>
+          </a:bodyPr>
           <a:lstStyle/>
           <a:p>
-            <a:pPr algn="ctr"/>
-            <a:endParaRPr lang="pt-BR"/>
-          </a:p>
-        </p:txBody>
-      </p:sp>
-      <p:sp>
-        <p:nvSpPr>
-          <p:cNvPr id="7" name="Retângulo 6"/>
-          <p:cNvSpPr/>
-          <p:nvPr/>
-        </p:nvSpPr>
-        <p:spPr>
-          <a:xfrm>
-            <a:off x="1906073" y="4278968"/>
-            <a:ext cx="2498502" cy="293032"/>
-          </a:xfrm>
-          <a:prstGeom prst="rect">
-            <a:avLst/>
-          </a:prstGeom>
-          <a:noFill/>
-          <a:ln>
-            <a:solidFill>
-              <a:srgbClr val="FF0000"/>
-            </a:solidFill>
-          </a:ln>
-        </p:spPr>
-        <p:style>
-          <a:lnRef idx="2">
-            <a:schemeClr val="accent1">
-              <a:shade val="50000"/>
-            </a:schemeClr>
-          </a:lnRef>
-          <a:fillRef idx="1">
-            <a:schemeClr val="accent1"/>
-          </a:fillRef>
-          <a:effectRef idx="0">
-            <a:schemeClr val="accent1"/>
-          </a:effectRef>
-          <a:fontRef idx="minor">
-            <a:schemeClr val="lt1"/>
-          </a:fontRef>
-        </p:style>
-        <p:txBody>
-          <a:bodyPr rtlCol="0" anchor="ctr"/>
-          <a:lstStyle/>
-          <a:p>
-            <a:pPr algn="ctr"/>
-            <a:endParaRPr lang="pt-BR"/>
+            <a:r>
+              <a:rPr lang="pt-BR" sz="2400" dirty="0" smtClean="0"/>
+              <a:t>Nome do arquivo: </a:t>
+            </a:r>
+            <a:r>
+              <a:rPr lang="pt-BR" sz="2400" b="1" dirty="0" err="1" smtClean="0"/>
+              <a:t>Selenium.feature</a:t>
+            </a:r>
+            <a:endParaRPr lang="pt-BR" sz="2400" b="1" dirty="0"/>
           </a:p>
         </p:txBody>
       </p:sp>
@@ -7303,8 +7218,8 @@
           <a:lstStyle/>
           <a:p>
             <a:r>
-              <a:rPr lang="pt-BR" dirty="0" smtClean="0"/>
-              <a:t>Esquema de cenário</a:t>
+              <a:rPr lang="pt-BR" dirty="0" err="1" smtClean="0"/>
+              <a:t>Tags</a:t>
             </a:r>
             <a:endParaRPr lang="pt-BR" b="0" dirty="0">
               <a:solidFill>
@@ -7338,7 +7253,7 @@
           <a:p>
             <a:r>
               <a:rPr lang="pt-BR" dirty="0" smtClean="0"/>
-              <a:t>Utilizado para executar um mesmo cenário com diferentes valores</a:t>
+              <a:t>Utilizado para agrupar cenários e criar suítes de teste</a:t>
             </a:r>
             <a:endParaRPr lang="pt-BR" dirty="0"/>
           </a:p>
@@ -7346,7 +7261,7 @@
       </p:sp>
       <p:pic>
         <p:nvPicPr>
-          <p:cNvPr id="2" name="Imagem 1"/>
+          <p:cNvPr id="3" name="Imagem 2"/>
           <p:cNvPicPr>
             <a:picLocks noChangeAspect="1"/>
           </p:cNvPicPr>
@@ -7360,8 +7275,8 @@
         </p:blipFill>
         <p:spPr>
           <a:xfrm>
-            <a:off x="1392862" y="2562896"/>
-            <a:ext cx="9559000" cy="3272617"/>
+            <a:off x="1824136" y="2575029"/>
+            <a:ext cx="9058512" cy="3330604"/>
           </a:xfrm>
           <a:prstGeom prst="rect">
             <a:avLst/>
@@ -7380,14 +7295,14 @@
       </p:pic>
       <p:sp>
         <p:nvSpPr>
-          <p:cNvPr id="8" name="Retângulo 7"/>
+          <p:cNvPr id="6" name="Retângulo 5"/>
           <p:cNvSpPr/>
           <p:nvPr/>
         </p:nvSpPr>
         <p:spPr>
           <a:xfrm>
-            <a:off x="1571222" y="4282543"/>
-            <a:ext cx="5640947" cy="1461433"/>
+            <a:off x="1931831" y="2626545"/>
+            <a:ext cx="2112135" cy="296960"/>
           </a:xfrm>
           <a:prstGeom prst="rect">
             <a:avLst/>
@@ -7426,14 +7341,14 @@
       </p:sp>
       <p:sp>
         <p:nvSpPr>
-          <p:cNvPr id="9" name="Retângulo 8"/>
+          <p:cNvPr id="7" name="Retângulo 6"/>
           <p:cNvSpPr/>
           <p:nvPr/>
         </p:nvSpPr>
         <p:spPr>
           <a:xfrm>
-            <a:off x="4172755" y="3428206"/>
-            <a:ext cx="2562896" cy="268030"/>
+            <a:off x="1906073" y="4278968"/>
+            <a:ext cx="2498502" cy="293032"/>
           </a:xfrm>
           <a:prstGeom prst="rect">
             <a:avLst/>
@@ -7470,56 +7385,10 @@
           </a:p>
         </p:txBody>
       </p:sp>
-      <p:sp>
-        <p:nvSpPr>
-          <p:cNvPr id="10" name="Retângulo 9"/>
-          <p:cNvSpPr/>
-          <p:nvPr/>
-        </p:nvSpPr>
-        <p:spPr>
-          <a:xfrm>
-            <a:off x="6120062" y="3753556"/>
-            <a:ext cx="2701965" cy="292835"/>
-          </a:xfrm>
-          <a:prstGeom prst="rect">
-            <a:avLst/>
-          </a:prstGeom>
-          <a:noFill/>
-          <a:ln>
-            <a:solidFill>
-              <a:srgbClr val="FF0000"/>
-            </a:solidFill>
-          </a:ln>
-        </p:spPr>
-        <p:style>
-          <a:lnRef idx="2">
-            <a:schemeClr val="accent1">
-              <a:shade val="50000"/>
-            </a:schemeClr>
-          </a:lnRef>
-          <a:fillRef idx="1">
-            <a:schemeClr val="accent1"/>
-          </a:fillRef>
-          <a:effectRef idx="0">
-            <a:schemeClr val="accent1"/>
-          </a:effectRef>
-          <a:fontRef idx="minor">
-            <a:schemeClr val="lt1"/>
-          </a:fontRef>
-        </p:style>
-        <p:txBody>
-          <a:bodyPr rtlCol="0" anchor="ctr"/>
-          <a:lstStyle/>
-          <a:p>
-            <a:pPr algn="ctr"/>
-            <a:endParaRPr lang="pt-BR"/>
-          </a:p>
-        </p:txBody>
-      </p:sp>
     </p:spTree>
     <p:extLst>
       <p:ext uri="{BB962C8B-B14F-4D97-AF65-F5344CB8AC3E}">
-        <p14:creationId xmlns:p14="http://schemas.microsoft.com/office/powerpoint/2010/main" val="1037394752"/>
+        <p14:creationId xmlns:p14="http://schemas.microsoft.com/office/powerpoint/2010/main" val="1753914068"/>
       </p:ext>
     </p:extLst>
   </p:cSld>
@@ -7569,8 +7438,8 @@
           <a:lstStyle/>
           <a:p>
             <a:r>
-              <a:rPr lang="pt-BR" dirty="0" err="1" smtClean="0"/>
-              <a:t>DataTables</a:t>
+              <a:rPr lang="pt-BR" dirty="0" smtClean="0"/>
+              <a:t>Esquema de cenário</a:t>
             </a:r>
             <a:endParaRPr lang="pt-BR" b="0" dirty="0">
               <a:solidFill>
@@ -7604,94 +7473,30 @@
           <a:p>
             <a:r>
               <a:rPr lang="pt-BR" dirty="0" smtClean="0"/>
-              <a:t>Permite criar tabelas que são convertidas em </a:t>
-            </a:r>
-            <a:r>
-              <a:rPr lang="pt-BR" b="1" dirty="0" err="1" smtClean="0">
-                <a:solidFill>
-                  <a:schemeClr val="accent2"/>
-                </a:solidFill>
-                <a:latin typeface="Consolas" panose="020B0609020204030204" pitchFamily="49" charset="0"/>
-              </a:rPr>
-              <a:t>List</a:t>
-            </a:r>
-            <a:r>
-              <a:rPr lang="pt-BR" b="1" dirty="0" smtClean="0">
-                <a:solidFill>
-                  <a:schemeClr val="accent2"/>
-                </a:solidFill>
-                <a:latin typeface="Consolas" panose="020B0609020204030204" pitchFamily="49" charset="0"/>
-              </a:rPr>
-              <a:t>&lt;</a:t>
-            </a:r>
-            <a:r>
-              <a:rPr lang="pt-BR" b="1" dirty="0" err="1" smtClean="0">
-                <a:solidFill>
-                  <a:schemeClr val="accent2"/>
-                </a:solidFill>
-                <a:latin typeface="Consolas" panose="020B0609020204030204" pitchFamily="49" charset="0"/>
-              </a:rPr>
-              <a:t>List</a:t>
-            </a:r>
-            <a:r>
-              <a:rPr lang="pt-BR" b="1" dirty="0" smtClean="0">
-                <a:solidFill>
-                  <a:schemeClr val="accent2"/>
-                </a:solidFill>
-                <a:latin typeface="Consolas" panose="020B0609020204030204" pitchFamily="49" charset="0"/>
-              </a:rPr>
-              <a:t>&lt;</a:t>
-            </a:r>
-            <a:r>
-              <a:rPr lang="pt-BR" b="1" dirty="0" err="1" smtClean="0">
-                <a:solidFill>
-                  <a:schemeClr val="accent2"/>
-                </a:solidFill>
-                <a:latin typeface="Consolas" panose="020B0609020204030204" pitchFamily="49" charset="0"/>
-              </a:rPr>
-              <a:t>string</a:t>
-            </a:r>
-            <a:r>
-              <a:rPr lang="pt-BR" b="1" dirty="0" smtClean="0">
-                <a:solidFill>
-                  <a:schemeClr val="accent2"/>
-                </a:solidFill>
-                <a:latin typeface="Consolas" panose="020B0609020204030204" pitchFamily="49" charset="0"/>
-              </a:rPr>
-              <a:t>&gt;&gt;</a:t>
-            </a:r>
-            <a:endParaRPr lang="pt-BR" b="1" dirty="0">
-              <a:solidFill>
-                <a:schemeClr val="accent2"/>
-              </a:solidFill>
-              <a:latin typeface="Consolas" panose="020B0609020204030204" pitchFamily="49" charset="0"/>
-            </a:endParaRPr>
-          </a:p>
-          <a:p>
-            <a:r>
-              <a:rPr lang="pt-BR" dirty="0" smtClean="0"/>
-              <a:t>Podemos iterar a lista extraindo suas informações</a:t>
-            </a:r>
+              <a:t>Utilizado para executar um mesmo cenário com diferentes valores</a:t>
+            </a:r>
+            <a:endParaRPr lang="pt-BR" dirty="0"/>
           </a:p>
         </p:txBody>
       </p:sp>
       <p:pic>
         <p:nvPicPr>
-          <p:cNvPr id="3" name="Imagem 2"/>
+          <p:cNvPr id="2" name="Imagem 1"/>
           <p:cNvPicPr>
             <a:picLocks noChangeAspect="1"/>
           </p:cNvPicPr>
           <p:nvPr/>
         </p:nvPicPr>
-        <p:blipFill rotWithShape="1">
+        <p:blipFill>
           <a:blip r:embed="rId2"/>
-          <a:srcRect l="30821" t="19755" r="38636" b="60139"/>
-          <a:stretch/>
+          <a:stretch>
+            <a:fillRect/>
+          </a:stretch>
         </p:blipFill>
         <p:spPr>
           <a:xfrm>
-            <a:off x="1755445" y="2859109"/>
-            <a:ext cx="8791719" cy="3253873"/>
+            <a:off x="1392862" y="2562896"/>
+            <a:ext cx="9559000" cy="3272617"/>
           </a:xfrm>
           <a:prstGeom prst="rect">
             <a:avLst/>
@@ -7710,14 +7515,14 @@
       </p:pic>
       <p:sp>
         <p:nvSpPr>
-          <p:cNvPr id="6" name="Retângulo 5"/>
+          <p:cNvPr id="8" name="Retângulo 7"/>
           <p:cNvSpPr/>
           <p:nvPr/>
         </p:nvSpPr>
         <p:spPr>
           <a:xfrm>
-            <a:off x="2318196" y="4664577"/>
-            <a:ext cx="8036417" cy="1336977"/>
+            <a:off x="1571222" y="4282543"/>
+            <a:ext cx="5640947" cy="1461433"/>
           </a:xfrm>
           <a:prstGeom prst="rect">
             <a:avLst/>
@@ -7754,10 +7559,102 @@
           </a:p>
         </p:txBody>
       </p:sp>
+      <p:sp>
+        <p:nvSpPr>
+          <p:cNvPr id="9" name="Retângulo 8"/>
+          <p:cNvSpPr/>
+          <p:nvPr/>
+        </p:nvSpPr>
+        <p:spPr>
+          <a:xfrm>
+            <a:off x="4172755" y="3428206"/>
+            <a:ext cx="2562896" cy="268030"/>
+          </a:xfrm>
+          <a:prstGeom prst="rect">
+            <a:avLst/>
+          </a:prstGeom>
+          <a:noFill/>
+          <a:ln>
+            <a:solidFill>
+              <a:srgbClr val="FF0000"/>
+            </a:solidFill>
+          </a:ln>
+        </p:spPr>
+        <p:style>
+          <a:lnRef idx="2">
+            <a:schemeClr val="accent1">
+              <a:shade val="50000"/>
+            </a:schemeClr>
+          </a:lnRef>
+          <a:fillRef idx="1">
+            <a:schemeClr val="accent1"/>
+          </a:fillRef>
+          <a:effectRef idx="0">
+            <a:schemeClr val="accent1"/>
+          </a:effectRef>
+          <a:fontRef idx="minor">
+            <a:schemeClr val="lt1"/>
+          </a:fontRef>
+        </p:style>
+        <p:txBody>
+          <a:bodyPr rtlCol="0" anchor="ctr"/>
+          <a:lstStyle/>
+          <a:p>
+            <a:pPr algn="ctr"/>
+            <a:endParaRPr lang="pt-BR"/>
+          </a:p>
+        </p:txBody>
+      </p:sp>
+      <p:sp>
+        <p:nvSpPr>
+          <p:cNvPr id="10" name="Retângulo 9"/>
+          <p:cNvSpPr/>
+          <p:nvPr/>
+        </p:nvSpPr>
+        <p:spPr>
+          <a:xfrm>
+            <a:off x="6120062" y="3753556"/>
+            <a:ext cx="2701965" cy="292835"/>
+          </a:xfrm>
+          <a:prstGeom prst="rect">
+            <a:avLst/>
+          </a:prstGeom>
+          <a:noFill/>
+          <a:ln>
+            <a:solidFill>
+              <a:srgbClr val="FF0000"/>
+            </a:solidFill>
+          </a:ln>
+        </p:spPr>
+        <p:style>
+          <a:lnRef idx="2">
+            <a:schemeClr val="accent1">
+              <a:shade val="50000"/>
+            </a:schemeClr>
+          </a:lnRef>
+          <a:fillRef idx="1">
+            <a:schemeClr val="accent1"/>
+          </a:fillRef>
+          <a:effectRef idx="0">
+            <a:schemeClr val="accent1"/>
+          </a:effectRef>
+          <a:fontRef idx="minor">
+            <a:schemeClr val="lt1"/>
+          </a:fontRef>
+        </p:style>
+        <p:txBody>
+          <a:bodyPr rtlCol="0" anchor="ctr"/>
+          <a:lstStyle/>
+          <a:p>
+            <a:pPr algn="ctr"/>
+            <a:endParaRPr lang="pt-BR"/>
+          </a:p>
+        </p:txBody>
+      </p:sp>
     </p:spTree>
     <p:extLst>
       <p:ext uri="{BB962C8B-B14F-4D97-AF65-F5344CB8AC3E}">
-        <p14:creationId xmlns:p14="http://schemas.microsoft.com/office/powerpoint/2010/main" val="929338673"/>
+        <p14:creationId xmlns:p14="http://schemas.microsoft.com/office/powerpoint/2010/main" val="1037394752"/>
       </p:ext>
     </p:extLst>
   </p:cSld>
@@ -7817,18 +7714,7 @@
                 </a:solidFill>
                 <a:latin typeface="Arial Black" panose="020B0A04020102020204" pitchFamily="34" charset="0"/>
               </a:rPr>
-              <a:t>0.1</a:t>
-            </a:r>
-            <a:r>
-              <a:rPr lang="pt-BR" sz="2400" dirty="0" smtClean="0">
-                <a:solidFill>
-                  <a:schemeClr val="bg1">
-                    <a:lumMod val="65000"/>
-                  </a:schemeClr>
-                </a:solidFill>
-                <a:latin typeface="Arial Black" panose="020B0A04020102020204" pitchFamily="34" charset="0"/>
-              </a:rPr>
-              <a:t>.</a:t>
+              <a:t>0.1.</a:t>
             </a:r>
             <a:r>
               <a:rPr lang="pt-BR" sz="2200" dirty="0" smtClean="0">
@@ -7904,28 +7790,8 @@
           <a:lstStyle/>
           <a:p>
             <a:r>
-              <a:rPr lang="pt-BR" dirty="0" smtClean="0"/>
-              <a:t>@</a:t>
-            </a:r>
-            <a:r>
               <a:rPr lang="pt-BR" dirty="0" err="1" smtClean="0"/>
-              <a:t>Before</a:t>
-            </a:r>
-            <a:r>
-              <a:rPr lang="pt-BR" dirty="0" smtClean="0"/>
-              <a:t> e @</a:t>
-            </a:r>
-            <a:r>
-              <a:rPr lang="pt-BR" dirty="0" err="1" smtClean="0"/>
-              <a:t>After</a:t>
-            </a:r>
-            <a:r>
-              <a:rPr lang="pt-BR" dirty="0" smtClean="0"/>
-              <a:t> do </a:t>
-            </a:r>
-            <a:r>
-              <a:rPr lang="pt-BR" dirty="0" err="1" smtClean="0"/>
-              <a:t>Cucumber</a:t>
+              <a:t>DataTables</a:t>
             </a:r>
             <a:endParaRPr lang="pt-BR" b="0" dirty="0">
               <a:solidFill>
@@ -7948,7 +7814,7 @@
         <p:spPr>
           <a:xfrm>
             <a:off x="464714" y="1825625"/>
-            <a:ext cx="5008434" cy="1278183"/>
+            <a:ext cx="11216424" cy="1278183"/>
           </a:xfrm>
         </p:spPr>
         <p:txBody>
@@ -7959,14 +7825,80 @@
           <a:p>
             <a:r>
               <a:rPr lang="pt-BR" dirty="0" smtClean="0"/>
-              <a:t>Executa ações antes e depois de cada cenário</a:t>
+              <a:t>Permite criar tabelas que são convertidas em </a:t>
+            </a:r>
+            <a:r>
+              <a:rPr lang="pt-BR" b="1" dirty="0" err="1" smtClean="0">
+                <a:solidFill>
+                  <a:schemeClr val="accent2"/>
+                </a:solidFill>
+                <a:latin typeface="Consolas" panose="020B0609020204030204" pitchFamily="49" charset="0"/>
+              </a:rPr>
+              <a:t>List</a:t>
+            </a:r>
+            <a:r>
+              <a:rPr lang="pt-BR" b="1" dirty="0" smtClean="0">
+                <a:solidFill>
+                  <a:schemeClr val="accent2"/>
+                </a:solidFill>
+                <a:latin typeface="Consolas" panose="020B0609020204030204" pitchFamily="49" charset="0"/>
+              </a:rPr>
+              <a:t>&lt;</a:t>
+            </a:r>
+            <a:r>
+              <a:rPr lang="pt-BR" b="1" dirty="0" err="1" smtClean="0">
+                <a:solidFill>
+                  <a:schemeClr val="accent2"/>
+                </a:solidFill>
+                <a:latin typeface="Consolas" panose="020B0609020204030204" pitchFamily="49" charset="0"/>
+              </a:rPr>
+              <a:t>List</a:t>
+            </a:r>
+            <a:r>
+              <a:rPr lang="pt-BR" b="1" dirty="0" smtClean="0">
+                <a:solidFill>
+                  <a:schemeClr val="accent2"/>
+                </a:solidFill>
+                <a:latin typeface="Consolas" panose="020B0609020204030204" pitchFamily="49" charset="0"/>
+              </a:rPr>
+              <a:t>&lt;</a:t>
+            </a:r>
+            <a:r>
+              <a:rPr lang="pt-BR" b="1" dirty="0" err="1" smtClean="0">
+                <a:solidFill>
+                  <a:schemeClr val="accent2"/>
+                </a:solidFill>
+                <a:latin typeface="Consolas" panose="020B0609020204030204" pitchFamily="49" charset="0"/>
+              </a:rPr>
+              <a:t>string</a:t>
+            </a:r>
+            <a:r>
+              <a:rPr lang="pt-BR" b="1" dirty="0" smtClean="0">
+                <a:solidFill>
+                  <a:schemeClr val="accent2"/>
+                </a:solidFill>
+                <a:latin typeface="Consolas" panose="020B0609020204030204" pitchFamily="49" charset="0"/>
+              </a:rPr>
+              <a:t>&gt;&gt;</a:t>
+            </a:r>
+            <a:endParaRPr lang="pt-BR" b="1" dirty="0">
+              <a:solidFill>
+                <a:schemeClr val="accent2"/>
+              </a:solidFill>
+              <a:latin typeface="Consolas" panose="020B0609020204030204" pitchFamily="49" charset="0"/>
+            </a:endParaRPr>
+          </a:p>
+          <a:p>
+            <a:r>
+              <a:rPr lang="pt-BR" dirty="0" smtClean="0"/>
+              <a:t>Podemos iterar a lista extraindo suas informações</a:t>
             </a:r>
           </a:p>
         </p:txBody>
       </p:sp>
       <p:pic>
         <p:nvPicPr>
-          <p:cNvPr id="6" name="Imagem 5"/>
+          <p:cNvPr id="3" name="Imagem 2"/>
           <p:cNvPicPr>
             <a:picLocks noChangeAspect="1"/>
           </p:cNvPicPr>
@@ -7974,13 +7906,13 @@
         </p:nvPicPr>
         <p:blipFill rotWithShape="1">
           <a:blip r:embed="rId2"/>
-          <a:srcRect r="33382"/>
+          <a:srcRect l="30821" t="19755" r="38636" b="60139"/>
           <a:stretch/>
         </p:blipFill>
         <p:spPr>
           <a:xfrm>
-            <a:off x="5767570" y="2147406"/>
-            <a:ext cx="6290776" cy="2211259"/>
+            <a:off x="1755445" y="2859109"/>
+            <a:ext cx="8791719" cy="3253873"/>
           </a:xfrm>
           <a:prstGeom prst="rect">
             <a:avLst/>
@@ -7997,78 +7929,56 @@
           </a:effectLst>
         </p:spPr>
       </p:pic>
-      <p:pic>
-        <p:nvPicPr>
-          <p:cNvPr id="2" name="Imagem 1"/>
-          <p:cNvPicPr>
-            <a:picLocks noChangeAspect="1"/>
-          </p:cNvPicPr>
+      <p:sp>
+        <p:nvSpPr>
+          <p:cNvPr id="6" name="Retângulo 5"/>
+          <p:cNvSpPr/>
           <p:nvPr/>
-        </p:nvPicPr>
-        <p:blipFill>
-          <a:blip r:embed="rId3"/>
-          <a:stretch>
-            <a:fillRect/>
-          </a:stretch>
-        </p:blipFill>
-        <p:spPr>
-          <a:xfrm>
-            <a:off x="5874146" y="4618496"/>
-            <a:ext cx="6119074" cy="2099843"/>
+        </p:nvSpPr>
+        <p:spPr>
+          <a:xfrm>
+            <a:off x="2318196" y="4664577"/>
+            <a:ext cx="8036417" cy="1336977"/>
           </a:xfrm>
           <a:prstGeom prst="rect">
             <a:avLst/>
           </a:prstGeom>
+          <a:noFill/>
           <a:ln>
-            <a:noFill/>
+            <a:solidFill>
+              <a:srgbClr val="FF0000"/>
+            </a:solidFill>
           </a:ln>
-          <a:effectLst>
-            <a:outerShdw blurRad="292100" dist="139700" dir="2700000" algn="tl" rotWithShape="0">
-              <a:srgbClr val="333333">
-                <a:alpha val="65000"/>
-              </a:srgbClr>
-            </a:outerShdw>
-          </a:effectLst>
-        </p:spPr>
-      </p:pic>
-      <p:pic>
-        <p:nvPicPr>
-          <p:cNvPr id="7" name="Imagem 6"/>
-          <p:cNvPicPr>
-            <a:picLocks noChangeAspect="1"/>
-          </p:cNvPicPr>
-          <p:nvPr/>
-        </p:nvPicPr>
-        <p:blipFill>
-          <a:blip r:embed="rId4"/>
-          <a:stretch>
-            <a:fillRect/>
-          </a:stretch>
-        </p:blipFill>
-        <p:spPr>
-          <a:xfrm>
-            <a:off x="5767570" y="1478837"/>
-            <a:ext cx="3773998" cy="495737"/>
-          </a:xfrm>
-          <a:prstGeom prst="rect">
-            <a:avLst/>
-          </a:prstGeom>
-          <a:ln>
-            <a:noFill/>
-          </a:ln>
-          <a:effectLst>
-            <a:outerShdw blurRad="292100" dist="139700" dir="2700000" algn="tl" rotWithShape="0">
-              <a:srgbClr val="333333">
-                <a:alpha val="65000"/>
-              </a:srgbClr>
-            </a:outerShdw>
-          </a:effectLst>
-        </p:spPr>
-      </p:pic>
+        </p:spPr>
+        <p:style>
+          <a:lnRef idx="2">
+            <a:schemeClr val="accent1">
+              <a:shade val="50000"/>
+            </a:schemeClr>
+          </a:lnRef>
+          <a:fillRef idx="1">
+            <a:schemeClr val="accent1"/>
+          </a:fillRef>
+          <a:effectRef idx="0">
+            <a:schemeClr val="accent1"/>
+          </a:effectRef>
+          <a:fontRef idx="minor">
+            <a:schemeClr val="lt1"/>
+          </a:fontRef>
+        </p:style>
+        <p:txBody>
+          <a:bodyPr rtlCol="0" anchor="ctr"/>
+          <a:lstStyle/>
+          <a:p>
+            <a:pPr algn="ctr"/>
+            <a:endParaRPr lang="pt-BR"/>
+          </a:p>
+        </p:txBody>
+      </p:sp>
     </p:spTree>
     <p:extLst>
       <p:ext uri="{BB962C8B-B14F-4D97-AF65-F5344CB8AC3E}">
-        <p14:creationId xmlns:p14="http://schemas.microsoft.com/office/powerpoint/2010/main" val="3430206984"/>
+        <p14:creationId xmlns:p14="http://schemas.microsoft.com/office/powerpoint/2010/main" val="929338673"/>
       </p:ext>
     </p:extLst>
   </p:cSld>
@@ -8119,6 +8029,220 @@
           <a:p>
             <a:r>
               <a:rPr lang="pt-BR" dirty="0" smtClean="0"/>
+              <a:t>@</a:t>
+            </a:r>
+            <a:r>
+              <a:rPr lang="pt-BR" dirty="0" err="1" smtClean="0"/>
+              <a:t>Before</a:t>
+            </a:r>
+            <a:r>
+              <a:rPr lang="pt-BR" dirty="0" smtClean="0"/>
+              <a:t> e @</a:t>
+            </a:r>
+            <a:r>
+              <a:rPr lang="pt-BR" dirty="0" err="1" smtClean="0"/>
+              <a:t>After</a:t>
+            </a:r>
+            <a:r>
+              <a:rPr lang="pt-BR" dirty="0" smtClean="0"/>
+              <a:t> do </a:t>
+            </a:r>
+            <a:r>
+              <a:rPr lang="pt-BR" dirty="0" err="1" smtClean="0"/>
+              <a:t>Cucumber</a:t>
+            </a:r>
+            <a:endParaRPr lang="pt-BR" b="0" dirty="0">
+              <a:solidFill>
+                <a:srgbClr val="FBB041"/>
+              </a:solidFill>
+            </a:endParaRPr>
+          </a:p>
+        </p:txBody>
+      </p:sp>
+      <p:sp>
+        <p:nvSpPr>
+          <p:cNvPr id="5" name="Espaço Reservado para Conteúdo 4"/>
+          <p:cNvSpPr>
+            <a:spLocks noGrp="1"/>
+          </p:cNvSpPr>
+          <p:nvPr>
+            <p:ph sz="half" idx="1"/>
+          </p:nvPr>
+        </p:nvSpPr>
+        <p:spPr>
+          <a:xfrm>
+            <a:off x="464714" y="1825625"/>
+            <a:ext cx="5008434" cy="1278183"/>
+          </a:xfrm>
+        </p:spPr>
+        <p:txBody>
+          <a:bodyPr>
+            <a:normAutofit/>
+          </a:bodyPr>
+          <a:lstStyle/>
+          <a:p>
+            <a:r>
+              <a:rPr lang="pt-BR" dirty="0" smtClean="0"/>
+              <a:t>Executa ações antes e depois de cada cenário</a:t>
+            </a:r>
+          </a:p>
+        </p:txBody>
+      </p:sp>
+      <p:pic>
+        <p:nvPicPr>
+          <p:cNvPr id="6" name="Imagem 5"/>
+          <p:cNvPicPr>
+            <a:picLocks noChangeAspect="1"/>
+          </p:cNvPicPr>
+          <p:nvPr/>
+        </p:nvPicPr>
+        <p:blipFill rotWithShape="1">
+          <a:blip r:embed="rId2"/>
+          <a:srcRect r="33382"/>
+          <a:stretch/>
+        </p:blipFill>
+        <p:spPr>
+          <a:xfrm>
+            <a:off x="5767570" y="2147406"/>
+            <a:ext cx="6290776" cy="2211259"/>
+          </a:xfrm>
+          <a:prstGeom prst="rect">
+            <a:avLst/>
+          </a:prstGeom>
+          <a:ln>
+            <a:noFill/>
+          </a:ln>
+          <a:effectLst>
+            <a:outerShdw blurRad="292100" dist="139700" dir="2700000" algn="tl" rotWithShape="0">
+              <a:srgbClr val="333333">
+                <a:alpha val="65000"/>
+              </a:srgbClr>
+            </a:outerShdw>
+          </a:effectLst>
+        </p:spPr>
+      </p:pic>
+      <p:pic>
+        <p:nvPicPr>
+          <p:cNvPr id="2" name="Imagem 1"/>
+          <p:cNvPicPr>
+            <a:picLocks noChangeAspect="1"/>
+          </p:cNvPicPr>
+          <p:nvPr/>
+        </p:nvPicPr>
+        <p:blipFill>
+          <a:blip r:embed="rId3"/>
+          <a:stretch>
+            <a:fillRect/>
+          </a:stretch>
+        </p:blipFill>
+        <p:spPr>
+          <a:xfrm>
+            <a:off x="5874146" y="4618496"/>
+            <a:ext cx="6119074" cy="2099843"/>
+          </a:xfrm>
+          <a:prstGeom prst="rect">
+            <a:avLst/>
+          </a:prstGeom>
+          <a:ln>
+            <a:noFill/>
+          </a:ln>
+          <a:effectLst>
+            <a:outerShdw blurRad="292100" dist="139700" dir="2700000" algn="tl" rotWithShape="0">
+              <a:srgbClr val="333333">
+                <a:alpha val="65000"/>
+              </a:srgbClr>
+            </a:outerShdw>
+          </a:effectLst>
+        </p:spPr>
+      </p:pic>
+      <p:pic>
+        <p:nvPicPr>
+          <p:cNvPr id="7" name="Imagem 6"/>
+          <p:cNvPicPr>
+            <a:picLocks noChangeAspect="1"/>
+          </p:cNvPicPr>
+          <p:nvPr/>
+        </p:nvPicPr>
+        <p:blipFill>
+          <a:blip r:embed="rId4"/>
+          <a:stretch>
+            <a:fillRect/>
+          </a:stretch>
+        </p:blipFill>
+        <p:spPr>
+          <a:xfrm>
+            <a:off x="5767570" y="1478837"/>
+            <a:ext cx="3773998" cy="495737"/>
+          </a:xfrm>
+          <a:prstGeom prst="rect">
+            <a:avLst/>
+          </a:prstGeom>
+          <a:ln>
+            <a:noFill/>
+          </a:ln>
+          <a:effectLst>
+            <a:outerShdw blurRad="292100" dist="139700" dir="2700000" algn="tl" rotWithShape="0">
+              <a:srgbClr val="333333">
+                <a:alpha val="65000"/>
+              </a:srgbClr>
+            </a:outerShdw>
+          </a:effectLst>
+        </p:spPr>
+      </p:pic>
+    </p:spTree>
+    <p:extLst>
+      <p:ext uri="{BB962C8B-B14F-4D97-AF65-F5344CB8AC3E}">
+        <p14:creationId xmlns:p14="http://schemas.microsoft.com/office/powerpoint/2010/main" val="3430206984"/>
+      </p:ext>
+    </p:extLst>
+  </p:cSld>
+  <p:clrMapOvr>
+    <a:masterClrMapping/>
+  </p:clrMapOvr>
+  <p:timing>
+    <p:tnLst>
+      <p:par>
+        <p:cTn id="1" dur="indefinite" restart="never" nodeType="tmRoot"/>
+      </p:par>
+    </p:tnLst>
+  </p:timing>
+</p:sld>
+</file>
+
+<file path=ppt/slides/slide32.xml><?xml version="1.0" encoding="utf-8"?>
+<p:sld xmlns:a="http://schemas.openxmlformats.org/drawingml/2006/main" xmlns:r="http://schemas.openxmlformats.org/officeDocument/2006/relationships" xmlns:p="http://schemas.openxmlformats.org/presentationml/2006/main">
+  <p:cSld>
+    <p:spTree>
+      <p:nvGrpSpPr>
+        <p:cNvPr id="1" name=""/>
+        <p:cNvGrpSpPr/>
+        <p:nvPr/>
+      </p:nvGrpSpPr>
+      <p:grpSpPr>
+        <a:xfrm>
+          <a:off x="0" y="0"/>
+          <a:ext cx="0" cy="0"/>
+          <a:chOff x="0" y="0"/>
+          <a:chExt cx="0" cy="0"/>
+        </a:xfrm>
+      </p:grpSpPr>
+      <p:sp>
+        <p:nvSpPr>
+          <p:cNvPr id="4" name="Título 3"/>
+          <p:cNvSpPr>
+            <a:spLocks noGrp="1"/>
+          </p:cNvSpPr>
+          <p:nvPr>
+            <p:ph type="title"/>
+          </p:nvPr>
+        </p:nvSpPr>
+        <p:spPr/>
+        <p:txBody>
+          <a:bodyPr/>
+          <a:lstStyle/>
+          <a:p>
+            <a:r>
+              <a:rPr lang="pt-BR" dirty="0" smtClean="0"/>
               <a:t>Executando um teste</a:t>
             </a:r>
             <a:endParaRPr lang="pt-BR" b="0" dirty="0">
@@ -8230,7 +8354,7 @@
 </p:sld>
 </file>
 
-<file path=ppt/slides/slide32.xml><?xml version="1.0" encoding="utf-8"?>
+<file path=ppt/slides/slide33.xml><?xml version="1.0" encoding="utf-8"?>
 <p:sld xmlns:a="http://schemas.openxmlformats.org/drawingml/2006/main" xmlns:r="http://schemas.openxmlformats.org/officeDocument/2006/relationships" xmlns:p="http://schemas.openxmlformats.org/presentationml/2006/main">
   <p:cSld>
     <p:spTree>
@@ -8928,474 +9052,6 @@
   <p:timing>
     <p:tnLst>
       <p:par>
-        <p:cTn id="1" dur="indefinite" restart="never" nodeType="tmRoot">
-          <p:childTnLst>
-            <p:seq concurrent="1" nextAc="seek">
-              <p:cTn id="2" dur="indefinite" nodeType="mainSeq">
-                <p:childTnLst>
-                  <p:par>
-                    <p:cTn id="3" fill="hold">
-                      <p:stCondLst>
-                        <p:cond delay="indefinite"/>
-                      </p:stCondLst>
-                      <p:childTnLst>
-                        <p:par>
-                          <p:cTn id="4" fill="hold">
-                            <p:stCondLst>
-                              <p:cond delay="0"/>
-                            </p:stCondLst>
-                            <p:childTnLst>
-                              <p:par>
-                                <p:cTn id="5" presetID="10" presetClass="entr" presetSubtype="0" fill="hold" nodeType="clickEffect">
-                                  <p:stCondLst>
-                                    <p:cond delay="0"/>
-                                  </p:stCondLst>
-                                  <p:childTnLst>
-                                    <p:set>
-                                      <p:cBhvr>
-                                        <p:cTn id="6" dur="1" fill="hold">
-                                          <p:stCondLst>
-                                            <p:cond delay="0"/>
-                                          </p:stCondLst>
-                                        </p:cTn>
-                                        <p:tgtEl>
-                                          <p:spTgt spid="19"/>
-                                        </p:tgtEl>
-                                        <p:attrNameLst>
-                                          <p:attrName>style.visibility</p:attrName>
-                                        </p:attrNameLst>
-                                      </p:cBhvr>
-                                      <p:to>
-                                        <p:strVal val="visible"/>
-                                      </p:to>
-                                    </p:set>
-                                    <p:animEffect transition="in" filter="fade">
-                                      <p:cBhvr>
-                                        <p:cTn id="7" dur="500"/>
-                                        <p:tgtEl>
-                                          <p:spTgt spid="19"/>
-                                        </p:tgtEl>
-                                      </p:cBhvr>
-                                    </p:animEffect>
-                                  </p:childTnLst>
-                                </p:cTn>
-                              </p:par>
-                            </p:childTnLst>
-                          </p:cTn>
-                        </p:par>
-                      </p:childTnLst>
-                    </p:cTn>
-                  </p:par>
-                </p:childTnLst>
-              </p:cTn>
-              <p:prevCondLst>
-                <p:cond evt="onPrev" delay="0">
-                  <p:tgtEl>
-                    <p:sldTgt/>
-                  </p:tgtEl>
-                </p:cond>
-              </p:prevCondLst>
-              <p:nextCondLst>
-                <p:cond evt="onNext" delay="0">
-                  <p:tgtEl>
-                    <p:sldTgt/>
-                  </p:tgtEl>
-                </p:cond>
-              </p:nextCondLst>
-            </p:seq>
-          </p:childTnLst>
-        </p:cTn>
-      </p:par>
-    </p:tnLst>
-  </p:timing>
-</p:sld>
-</file>
-
-<file path=ppt/slides/slide33.xml><?xml version="1.0" encoding="utf-8"?>
-<p:sld xmlns:a="http://schemas.openxmlformats.org/drawingml/2006/main" xmlns:r="http://schemas.openxmlformats.org/officeDocument/2006/relationships" xmlns:p="http://schemas.openxmlformats.org/presentationml/2006/main">
-  <p:cSld>
-    <p:spTree>
-      <p:nvGrpSpPr>
-        <p:cNvPr id="1" name=""/>
-        <p:cNvGrpSpPr/>
-        <p:nvPr/>
-      </p:nvGrpSpPr>
-      <p:grpSpPr>
-        <a:xfrm>
-          <a:off x="0" y="0"/>
-          <a:ext cx="0" cy="0"/>
-          <a:chOff x="0" y="0"/>
-          <a:chExt cx="0" cy="0"/>
-        </a:xfrm>
-      </p:grpSpPr>
-      <p:sp>
-        <p:nvSpPr>
-          <p:cNvPr id="4" name="Título 3"/>
-          <p:cNvSpPr>
-            <a:spLocks noGrp="1"/>
-          </p:cNvSpPr>
-          <p:nvPr>
-            <p:ph type="title"/>
-          </p:nvPr>
-        </p:nvSpPr>
-        <p:spPr/>
-        <p:txBody>
-          <a:bodyPr/>
-          <a:lstStyle/>
-          <a:p>
-            <a:r>
-              <a:rPr lang="pt-BR" dirty="0" smtClean="0"/>
-              <a:t>Arquitetura do projeto</a:t>
-            </a:r>
-            <a:endParaRPr lang="pt-BR" b="0" dirty="0">
-              <a:solidFill>
-                <a:srgbClr val="FBB041"/>
-              </a:solidFill>
-            </a:endParaRPr>
-          </a:p>
-        </p:txBody>
-      </p:sp>
-      <p:sp>
-        <p:nvSpPr>
-          <p:cNvPr id="5" name="Espaço Reservado para Conteúdo 4"/>
-          <p:cNvSpPr>
-            <a:spLocks noGrp="1"/>
-          </p:cNvSpPr>
-          <p:nvPr>
-            <p:ph sz="half" idx="1"/>
-          </p:nvPr>
-        </p:nvSpPr>
-        <p:spPr>
-          <a:xfrm>
-            <a:off x="464713" y="1864261"/>
-            <a:ext cx="7043669" cy="3905474"/>
-          </a:xfrm>
-        </p:spPr>
-        <p:txBody>
-          <a:bodyPr>
-            <a:normAutofit/>
-          </a:bodyPr>
-          <a:lstStyle/>
-          <a:p>
-            <a:r>
-              <a:rPr lang="pt-BR" dirty="0" err="1" smtClean="0"/>
-              <a:t>Package</a:t>
-            </a:r>
-            <a:r>
-              <a:rPr lang="pt-BR" dirty="0" smtClean="0"/>
-              <a:t> </a:t>
-            </a:r>
-            <a:r>
-              <a:rPr lang="pt-BR" b="1" dirty="0" err="1" smtClean="0">
-                <a:solidFill>
-                  <a:srgbClr val="0070C0"/>
-                </a:solidFill>
-              </a:rPr>
-              <a:t>tests</a:t>
-            </a:r>
-            <a:r>
-              <a:rPr lang="pt-BR" dirty="0" smtClean="0"/>
-              <a:t>: arquivos que executam as </a:t>
-            </a:r>
-            <a:r>
-              <a:rPr lang="pt-BR" dirty="0" err="1" smtClean="0"/>
-              <a:t>features</a:t>
-            </a:r>
-            <a:endParaRPr lang="pt-BR" dirty="0" smtClean="0"/>
-          </a:p>
-          <a:p>
-            <a:r>
-              <a:rPr lang="pt-BR" dirty="0" smtClean="0"/>
-              <a:t>Pasta </a:t>
-            </a:r>
-            <a:r>
-              <a:rPr lang="pt-BR" b="1" dirty="0" err="1" smtClean="0">
-                <a:solidFill>
-                  <a:srgbClr val="0070C0"/>
-                </a:solidFill>
-              </a:rPr>
-              <a:t>features</a:t>
-            </a:r>
-            <a:r>
-              <a:rPr lang="pt-BR" dirty="0" smtClean="0"/>
-              <a:t>: descrição das funcionalidades</a:t>
-            </a:r>
-          </a:p>
-          <a:p>
-            <a:r>
-              <a:rPr lang="pt-BR" dirty="0" err="1"/>
-              <a:t>Package</a:t>
-            </a:r>
-            <a:r>
-              <a:rPr lang="pt-BR" dirty="0"/>
-              <a:t> </a:t>
-            </a:r>
-            <a:r>
-              <a:rPr lang="pt-BR" b="1" dirty="0" err="1">
-                <a:solidFill>
-                  <a:srgbClr val="0070C0"/>
-                </a:solidFill>
-              </a:rPr>
-              <a:t>steps</a:t>
-            </a:r>
-            <a:r>
-              <a:rPr lang="pt-BR" dirty="0"/>
-              <a:t>: </a:t>
-            </a:r>
-            <a:r>
-              <a:rPr lang="pt-BR" dirty="0" err="1"/>
-              <a:t>steps</a:t>
-            </a:r>
-            <a:r>
-              <a:rPr lang="pt-BR" dirty="0"/>
-              <a:t> </a:t>
-            </a:r>
-            <a:r>
-              <a:rPr lang="pt-BR" dirty="0" err="1"/>
-              <a:t>definitions</a:t>
-            </a:r>
-            <a:endParaRPr lang="pt-BR" dirty="0"/>
-          </a:p>
-          <a:p>
-            <a:r>
-              <a:rPr lang="pt-BR" dirty="0" err="1"/>
-              <a:t>Package</a:t>
-            </a:r>
-            <a:r>
-              <a:rPr lang="pt-BR" dirty="0"/>
-              <a:t> </a:t>
-            </a:r>
-            <a:r>
-              <a:rPr lang="pt-BR" b="1" dirty="0" err="1">
-                <a:solidFill>
-                  <a:srgbClr val="0070C0"/>
-                </a:solidFill>
-              </a:rPr>
-              <a:t>page</a:t>
-            </a:r>
-            <a:r>
-              <a:rPr lang="pt-BR" dirty="0"/>
-              <a:t>: classes </a:t>
-            </a:r>
-            <a:r>
-              <a:rPr lang="pt-BR" dirty="0" err="1"/>
-              <a:t>pageObjects</a:t>
-            </a:r>
-            <a:r>
-              <a:rPr lang="pt-BR" dirty="0"/>
-              <a:t> e </a:t>
-            </a:r>
-            <a:r>
-              <a:rPr lang="pt-BR" dirty="0" err="1"/>
-              <a:t>elementMap</a:t>
-            </a:r>
-            <a:endParaRPr lang="pt-BR" dirty="0"/>
-          </a:p>
-          <a:p>
-            <a:r>
-              <a:rPr lang="pt-BR" dirty="0" smtClean="0"/>
-              <a:t>Pasta </a:t>
-            </a:r>
-            <a:r>
-              <a:rPr lang="pt-BR" b="1" dirty="0" err="1" smtClean="0">
-                <a:solidFill>
-                  <a:srgbClr val="0070C0"/>
-                </a:solidFill>
-              </a:rPr>
-              <a:t>target</a:t>
-            </a:r>
-            <a:r>
-              <a:rPr lang="pt-BR" dirty="0" smtClean="0"/>
-              <a:t>: artefatos gerados durante os testes (evidencias e relatórios)</a:t>
-            </a:r>
-          </a:p>
-        </p:txBody>
-      </p:sp>
-      <p:pic>
-        <p:nvPicPr>
-          <p:cNvPr id="6" name="Imagem 5"/>
-          <p:cNvPicPr>
-            <a:picLocks noChangeAspect="1"/>
-          </p:cNvPicPr>
-          <p:nvPr/>
-        </p:nvPicPr>
-        <p:blipFill>
-          <a:blip r:embed="rId2"/>
-          <a:stretch>
-            <a:fillRect/>
-          </a:stretch>
-        </p:blipFill>
-        <p:spPr>
-          <a:xfrm>
-            <a:off x="8329408" y="95939"/>
-            <a:ext cx="3586978" cy="6633272"/>
-          </a:xfrm>
-          <a:prstGeom prst="rect">
-            <a:avLst/>
-          </a:prstGeom>
-          <a:ln>
-            <a:noFill/>
-          </a:ln>
-          <a:effectLst>
-            <a:outerShdw blurRad="292100" dist="139700" dir="2700000" algn="tl" rotWithShape="0">
-              <a:srgbClr val="333333">
-                <a:alpha val="65000"/>
-              </a:srgbClr>
-            </a:outerShdw>
-          </a:effectLst>
-        </p:spPr>
-      </p:pic>
-      <p:sp>
-        <p:nvSpPr>
-          <p:cNvPr id="7" name="Retângulo 6"/>
-          <p:cNvSpPr/>
-          <p:nvPr/>
-        </p:nvSpPr>
-        <p:spPr>
-          <a:xfrm>
-            <a:off x="8863262" y="2447087"/>
-            <a:ext cx="2701965" cy="1416575"/>
-          </a:xfrm>
-          <a:prstGeom prst="rect">
-            <a:avLst/>
-          </a:prstGeom>
-          <a:noFill/>
-          <a:ln>
-            <a:solidFill>
-              <a:srgbClr val="FF0000"/>
-            </a:solidFill>
-          </a:ln>
-        </p:spPr>
-        <p:style>
-          <a:lnRef idx="2">
-            <a:schemeClr val="accent1">
-              <a:shade val="50000"/>
-            </a:schemeClr>
-          </a:lnRef>
-          <a:fillRef idx="1">
-            <a:schemeClr val="accent1"/>
-          </a:fillRef>
-          <a:effectRef idx="0">
-            <a:schemeClr val="accent1"/>
-          </a:effectRef>
-          <a:fontRef idx="minor">
-            <a:schemeClr val="lt1"/>
-          </a:fontRef>
-        </p:style>
-        <p:txBody>
-          <a:bodyPr rtlCol="0" anchor="ctr"/>
-          <a:lstStyle/>
-          <a:p>
-            <a:pPr algn="ctr"/>
-            <a:endParaRPr lang="pt-BR"/>
-          </a:p>
-        </p:txBody>
-      </p:sp>
-      <p:sp>
-        <p:nvSpPr>
-          <p:cNvPr id="8" name="Retângulo 7"/>
-          <p:cNvSpPr/>
-          <p:nvPr/>
-        </p:nvSpPr>
-        <p:spPr>
-          <a:xfrm>
-            <a:off x="8616418" y="5769735"/>
-            <a:ext cx="1313194" cy="244699"/>
-          </a:xfrm>
-          <a:prstGeom prst="rect">
-            <a:avLst/>
-          </a:prstGeom>
-          <a:noFill/>
-          <a:ln>
-            <a:solidFill>
-              <a:srgbClr val="FF0000"/>
-            </a:solidFill>
-          </a:ln>
-        </p:spPr>
-        <p:style>
-          <a:lnRef idx="2">
-            <a:schemeClr val="accent1">
-              <a:shade val="50000"/>
-            </a:schemeClr>
-          </a:lnRef>
-          <a:fillRef idx="1">
-            <a:schemeClr val="accent1"/>
-          </a:fillRef>
-          <a:effectRef idx="0">
-            <a:schemeClr val="accent1"/>
-          </a:effectRef>
-          <a:fontRef idx="minor">
-            <a:schemeClr val="lt1"/>
-          </a:fontRef>
-        </p:style>
-        <p:txBody>
-          <a:bodyPr rtlCol="0" anchor="ctr"/>
-          <a:lstStyle/>
-          <a:p>
-            <a:pPr algn="ctr"/>
-            <a:endParaRPr lang="pt-BR"/>
-          </a:p>
-        </p:txBody>
-      </p:sp>
-      <p:sp>
-        <p:nvSpPr>
-          <p:cNvPr id="9" name="Retângulo 8"/>
-          <p:cNvSpPr/>
-          <p:nvPr/>
-        </p:nvSpPr>
-        <p:spPr>
-          <a:xfrm>
-            <a:off x="9105590" y="807503"/>
-            <a:ext cx="1313194" cy="686446"/>
-          </a:xfrm>
-          <a:prstGeom prst="rect">
-            <a:avLst/>
-          </a:prstGeom>
-          <a:noFill/>
-          <a:ln>
-            <a:solidFill>
-              <a:srgbClr val="FF0000"/>
-            </a:solidFill>
-          </a:ln>
-        </p:spPr>
-        <p:style>
-          <a:lnRef idx="2">
-            <a:schemeClr val="accent1">
-              <a:shade val="50000"/>
-            </a:schemeClr>
-          </a:lnRef>
-          <a:fillRef idx="1">
-            <a:schemeClr val="accent1"/>
-          </a:fillRef>
-          <a:effectRef idx="0">
-            <a:schemeClr val="accent1"/>
-          </a:effectRef>
-          <a:fontRef idx="minor">
-            <a:schemeClr val="lt1"/>
-          </a:fontRef>
-        </p:style>
-        <p:txBody>
-          <a:bodyPr rtlCol="0" anchor="ctr"/>
-          <a:lstStyle/>
-          <a:p>
-            <a:pPr algn="ctr"/>
-            <a:endParaRPr lang="pt-BR"/>
-          </a:p>
-        </p:txBody>
-      </p:sp>
-    </p:spTree>
-    <p:extLst>
-      <p:ext uri="{BB962C8B-B14F-4D97-AF65-F5344CB8AC3E}">
-        <p14:creationId xmlns:p14="http://schemas.microsoft.com/office/powerpoint/2010/main" val="3992981422"/>
-      </p:ext>
-    </p:extLst>
-  </p:cSld>
-  <p:clrMapOvr>
-    <a:masterClrMapping/>
-  </p:clrMapOvr>
-  <p:timing>
-    <p:tnLst>
-      <p:par>
         <p:cTn id="1" dur="indefinite" restart="never" nodeType="tmRoot"/>
       </p:par>
     </p:tnLst>
@@ -9437,7 +9093,7 @@
           <a:p>
             <a:r>
               <a:rPr lang="pt-BR" dirty="0" smtClean="0"/>
-              <a:t>Indicação de site</a:t>
+              <a:t>Arquitetura do projeto</a:t>
             </a:r>
             <a:endParaRPr lang="pt-BR" b="0" dirty="0">
               <a:solidFill>
@@ -9459,102 +9115,326 @@
         </p:nvSpPr>
         <p:spPr>
           <a:xfrm>
-            <a:off x="464713" y="3567447"/>
-            <a:ext cx="9799749" cy="2202287"/>
+            <a:off x="464713" y="1864261"/>
+            <a:ext cx="7043669" cy="3905474"/>
           </a:xfrm>
         </p:spPr>
         <p:txBody>
           <a:bodyPr>
-            <a:normAutofit fontScale="92500" lnSpcReduction="10000"/>
+            <a:normAutofit/>
           </a:bodyPr>
           <a:lstStyle/>
           <a:p>
-            <a:endParaRPr lang="pt-BR" dirty="0" err="1"/>
-          </a:p>
-          <a:p>
-            <a:pPr marL="0" indent="0">
-              <a:buNone/>
-            </a:pPr>
-            <a:r>
-              <a:rPr lang="pt-BR" dirty="0">
-                <a:hlinkClick r:id="rId2"/>
-              </a:rPr>
-              <a:t>https://automacaoforadacaixa.wordpress.com/2017/05/01/1-configuracao-ambiente-selenium-e-cucumber</a:t>
-            </a:r>
-            <a:r>
-              <a:rPr lang="pt-BR" dirty="0" smtClean="0">
-                <a:hlinkClick r:id="rId2"/>
-              </a:rPr>
-              <a:t>/</a:t>
+            <a:r>
+              <a:rPr lang="pt-BR" dirty="0" err="1" smtClean="0"/>
+              <a:t>Package</a:t>
+            </a:r>
+            <a:r>
+              <a:rPr lang="pt-BR" dirty="0" smtClean="0"/>
+              <a:t> </a:t>
+            </a:r>
+            <a:r>
+              <a:rPr lang="pt-BR" b="1" dirty="0" err="1" smtClean="0">
+                <a:solidFill>
+                  <a:srgbClr val="0070C0"/>
+                </a:solidFill>
+              </a:rPr>
+              <a:t>tests</a:t>
+            </a:r>
+            <a:r>
+              <a:rPr lang="pt-BR" dirty="0" smtClean="0"/>
+              <a:t>: arquivos que executam as </a:t>
+            </a:r>
+            <a:r>
+              <a:rPr lang="pt-BR" dirty="0" err="1" smtClean="0"/>
+              <a:t>features</a:t>
             </a:r>
             <a:endParaRPr lang="pt-BR" dirty="0" smtClean="0"/>
           </a:p>
           <a:p>
-            <a:pPr marL="0" indent="0">
-              <a:buNone/>
-            </a:pPr>
+            <a:r>
+              <a:rPr lang="pt-BR" dirty="0" smtClean="0"/>
+              <a:t>Pasta </a:t>
+            </a:r>
+            <a:r>
+              <a:rPr lang="pt-BR" b="1" dirty="0" err="1" smtClean="0">
+                <a:solidFill>
+                  <a:srgbClr val="0070C0"/>
+                </a:solidFill>
+              </a:rPr>
+              <a:t>features</a:t>
+            </a:r>
+            <a:r>
+              <a:rPr lang="pt-BR" dirty="0" smtClean="0"/>
+              <a:t>: descrição das funcionalidades</a:t>
+            </a:r>
+          </a:p>
+          <a:p>
+            <a:r>
+              <a:rPr lang="pt-BR" dirty="0" err="1"/>
+              <a:t>Package</a:t>
+            </a:r>
+            <a:r>
+              <a:rPr lang="pt-BR" dirty="0"/>
+              <a:t> </a:t>
+            </a:r>
+            <a:r>
+              <a:rPr lang="pt-BR" b="1" dirty="0" err="1">
+                <a:solidFill>
+                  <a:srgbClr val="0070C0"/>
+                </a:solidFill>
+              </a:rPr>
+              <a:t>steps</a:t>
+            </a:r>
+            <a:r>
+              <a:rPr lang="pt-BR" dirty="0"/>
+              <a:t>: </a:t>
+            </a:r>
+            <a:r>
+              <a:rPr lang="pt-BR" dirty="0" err="1"/>
+              <a:t>steps</a:t>
+            </a:r>
+            <a:r>
+              <a:rPr lang="pt-BR" dirty="0"/>
+              <a:t> </a:t>
+            </a:r>
+            <a:r>
+              <a:rPr lang="pt-BR" dirty="0" err="1"/>
+              <a:t>definitions</a:t>
+            </a:r>
             <a:endParaRPr lang="pt-BR" dirty="0"/>
           </a:p>
           <a:p>
             <a:r>
+              <a:rPr lang="pt-BR" dirty="0" err="1"/>
+              <a:t>Package</a:t>
+            </a:r>
+            <a:r>
+              <a:rPr lang="pt-BR" dirty="0"/>
+              <a:t> </a:t>
+            </a:r>
+            <a:r>
+              <a:rPr lang="pt-BR" b="1" dirty="0" err="1">
+                <a:solidFill>
+                  <a:srgbClr val="0070C0"/>
+                </a:solidFill>
+              </a:rPr>
+              <a:t>page</a:t>
+            </a:r>
+            <a:r>
+              <a:rPr lang="pt-BR" dirty="0"/>
+              <a:t>: classes </a:t>
+            </a:r>
+            <a:r>
+              <a:rPr lang="pt-BR" dirty="0" err="1"/>
+              <a:t>pageObjects</a:t>
+            </a:r>
+            <a:r>
+              <a:rPr lang="pt-BR" dirty="0"/>
+              <a:t> e </a:t>
+            </a:r>
+            <a:r>
+              <a:rPr lang="pt-BR" dirty="0" err="1"/>
+              <a:t>elementMap</a:t>
+            </a:r>
+            <a:endParaRPr lang="pt-BR" dirty="0"/>
+          </a:p>
+          <a:p>
+            <a:r>
               <a:rPr lang="pt-BR" dirty="0" smtClean="0"/>
-              <a:t>Passo a passo detalhado para configuração de ambiente, </a:t>
-            </a:r>
-            <a:r>
-              <a:rPr lang="pt-BR" dirty="0" err="1" smtClean="0"/>
-              <a:t>cucumber</a:t>
+              <a:t>Pasta </a:t>
+            </a:r>
+            <a:r>
+              <a:rPr lang="pt-BR" b="1" dirty="0" err="1" smtClean="0">
+                <a:solidFill>
+                  <a:srgbClr val="0070C0"/>
+                </a:solidFill>
+              </a:rPr>
+              <a:t>target</a:t>
             </a:r>
             <a:r>
               <a:rPr lang="pt-BR" dirty="0" smtClean="0"/>
-              <a:t>, </a:t>
-            </a:r>
-            <a:r>
-              <a:rPr lang="pt-BR" dirty="0" err="1" smtClean="0"/>
-              <a:t>selenium</a:t>
-            </a:r>
-            <a:r>
-              <a:rPr lang="pt-BR" dirty="0" smtClean="0"/>
-              <a:t>, logs, com </a:t>
-            </a:r>
-            <a:r>
-              <a:rPr lang="pt-BR" dirty="0" err="1" smtClean="0"/>
-              <a:t>prints</a:t>
-            </a:r>
-            <a:r>
-              <a:rPr lang="pt-BR" dirty="0" smtClean="0"/>
-              <a:t> e exercícios para praticar</a:t>
+              <a:t>: artefatos gerados durante os testes (evidencias e relatórios)</a:t>
             </a:r>
           </a:p>
         </p:txBody>
       </p:sp>
       <p:pic>
         <p:nvPicPr>
-          <p:cNvPr id="2" name="Imagem 1"/>
+          <p:cNvPr id="6" name="Imagem 5"/>
           <p:cNvPicPr>
             <a:picLocks noChangeAspect="1"/>
           </p:cNvPicPr>
           <p:nvPr/>
         </p:nvPicPr>
         <p:blipFill>
-          <a:blip r:embed="rId3"/>
+          <a:blip r:embed="rId2"/>
           <a:stretch>
             <a:fillRect/>
           </a:stretch>
         </p:blipFill>
         <p:spPr>
           <a:xfrm>
-            <a:off x="2452938" y="1767222"/>
-            <a:ext cx="7077428" cy="1737187"/>
+            <a:off x="8329408" y="95939"/>
+            <a:ext cx="3586978" cy="6633272"/>
           </a:xfrm>
           <a:prstGeom prst="rect">
             <a:avLst/>
           </a:prstGeom>
+          <a:ln>
+            <a:noFill/>
+          </a:ln>
+          <a:effectLst>
+            <a:outerShdw blurRad="292100" dist="139700" dir="2700000" algn="tl" rotWithShape="0">
+              <a:srgbClr val="333333">
+                <a:alpha val="65000"/>
+              </a:srgbClr>
+            </a:outerShdw>
+          </a:effectLst>
         </p:spPr>
       </p:pic>
+      <p:sp>
+        <p:nvSpPr>
+          <p:cNvPr id="7" name="Retângulo 6"/>
+          <p:cNvSpPr/>
+          <p:nvPr/>
+        </p:nvSpPr>
+        <p:spPr>
+          <a:xfrm>
+            <a:off x="8863262" y="2447087"/>
+            <a:ext cx="2701965" cy="1416575"/>
+          </a:xfrm>
+          <a:prstGeom prst="rect">
+            <a:avLst/>
+          </a:prstGeom>
+          <a:noFill/>
+          <a:ln>
+            <a:solidFill>
+              <a:srgbClr val="FF0000"/>
+            </a:solidFill>
+          </a:ln>
+        </p:spPr>
+        <p:style>
+          <a:lnRef idx="2">
+            <a:schemeClr val="accent1">
+              <a:shade val="50000"/>
+            </a:schemeClr>
+          </a:lnRef>
+          <a:fillRef idx="1">
+            <a:schemeClr val="accent1"/>
+          </a:fillRef>
+          <a:effectRef idx="0">
+            <a:schemeClr val="accent1"/>
+          </a:effectRef>
+          <a:fontRef idx="minor">
+            <a:schemeClr val="lt1"/>
+          </a:fontRef>
+        </p:style>
+        <p:txBody>
+          <a:bodyPr rtlCol="0" anchor="ctr"/>
+          <a:lstStyle/>
+          <a:p>
+            <a:pPr algn="ctr"/>
+            <a:endParaRPr lang="pt-BR"/>
+          </a:p>
+        </p:txBody>
+      </p:sp>
+      <p:sp>
+        <p:nvSpPr>
+          <p:cNvPr id="8" name="Retângulo 7"/>
+          <p:cNvSpPr/>
+          <p:nvPr/>
+        </p:nvSpPr>
+        <p:spPr>
+          <a:xfrm>
+            <a:off x="8616418" y="5769735"/>
+            <a:ext cx="1313194" cy="244699"/>
+          </a:xfrm>
+          <a:prstGeom prst="rect">
+            <a:avLst/>
+          </a:prstGeom>
+          <a:noFill/>
+          <a:ln>
+            <a:solidFill>
+              <a:srgbClr val="FF0000"/>
+            </a:solidFill>
+          </a:ln>
+        </p:spPr>
+        <p:style>
+          <a:lnRef idx="2">
+            <a:schemeClr val="accent1">
+              <a:shade val="50000"/>
+            </a:schemeClr>
+          </a:lnRef>
+          <a:fillRef idx="1">
+            <a:schemeClr val="accent1"/>
+          </a:fillRef>
+          <a:effectRef idx="0">
+            <a:schemeClr val="accent1"/>
+          </a:effectRef>
+          <a:fontRef idx="minor">
+            <a:schemeClr val="lt1"/>
+          </a:fontRef>
+        </p:style>
+        <p:txBody>
+          <a:bodyPr rtlCol="0" anchor="ctr"/>
+          <a:lstStyle/>
+          <a:p>
+            <a:pPr algn="ctr"/>
+            <a:endParaRPr lang="pt-BR"/>
+          </a:p>
+        </p:txBody>
+      </p:sp>
+      <p:sp>
+        <p:nvSpPr>
+          <p:cNvPr id="9" name="Retângulo 8"/>
+          <p:cNvSpPr/>
+          <p:nvPr/>
+        </p:nvSpPr>
+        <p:spPr>
+          <a:xfrm>
+            <a:off x="9105590" y="807503"/>
+            <a:ext cx="1313194" cy="686446"/>
+          </a:xfrm>
+          <a:prstGeom prst="rect">
+            <a:avLst/>
+          </a:prstGeom>
+          <a:noFill/>
+          <a:ln>
+            <a:solidFill>
+              <a:srgbClr val="FF0000"/>
+            </a:solidFill>
+          </a:ln>
+        </p:spPr>
+        <p:style>
+          <a:lnRef idx="2">
+            <a:schemeClr val="accent1">
+              <a:shade val="50000"/>
+            </a:schemeClr>
+          </a:lnRef>
+          <a:fillRef idx="1">
+            <a:schemeClr val="accent1"/>
+          </a:fillRef>
+          <a:effectRef idx="0">
+            <a:schemeClr val="accent1"/>
+          </a:effectRef>
+          <a:fontRef idx="minor">
+            <a:schemeClr val="lt1"/>
+          </a:fontRef>
+        </p:style>
+        <p:txBody>
+          <a:bodyPr rtlCol="0" anchor="ctr"/>
+          <a:lstStyle/>
+          <a:p>
+            <a:pPr algn="ctr"/>
+            <a:endParaRPr lang="pt-BR"/>
+          </a:p>
+        </p:txBody>
+      </p:sp>
     </p:spTree>
     <p:extLst>
       <p:ext uri="{BB962C8B-B14F-4D97-AF65-F5344CB8AC3E}">
-        <p14:creationId xmlns:p14="http://schemas.microsoft.com/office/powerpoint/2010/main" val="3654481959"/>
+        <p14:creationId xmlns:p14="http://schemas.microsoft.com/office/powerpoint/2010/main" val="3992981422"/>
       </p:ext>
     </p:extLst>
   </p:cSld>
@@ -9595,52 +9475,134 @@
             <a:spLocks noGrp="1"/>
           </p:cNvSpPr>
           <p:nvPr>
-            <p:ph type="ctrTitle"/>
+            <p:ph type="title"/>
           </p:nvPr>
         </p:nvSpPr>
         <p:spPr/>
         <p:txBody>
+          <a:bodyPr/>
+          <a:lstStyle/>
+          <a:p>
+            <a:r>
+              <a:rPr lang="pt-BR" dirty="0" smtClean="0"/>
+              <a:t>Indicação de site</a:t>
+            </a:r>
+            <a:endParaRPr lang="pt-BR" b="0" dirty="0">
+              <a:solidFill>
+                <a:srgbClr val="FBB041"/>
+              </a:solidFill>
+            </a:endParaRPr>
+          </a:p>
+        </p:txBody>
+      </p:sp>
+      <p:sp>
+        <p:nvSpPr>
+          <p:cNvPr id="5" name="Espaço Reservado para Conteúdo 4"/>
+          <p:cNvSpPr>
+            <a:spLocks noGrp="1"/>
+          </p:cNvSpPr>
+          <p:nvPr>
+            <p:ph sz="half" idx="1"/>
+          </p:nvPr>
+        </p:nvSpPr>
+        <p:spPr>
+          <a:xfrm>
+            <a:off x="464713" y="3567447"/>
+            <a:ext cx="9799749" cy="2202287"/>
+          </a:xfrm>
+        </p:spPr>
+        <p:txBody>
           <a:bodyPr>
-            <a:normAutofit/>
+            <a:normAutofit fontScale="92500" lnSpcReduction="10000"/>
           </a:bodyPr>
           <a:lstStyle/>
           <a:p>
-            <a:r>
-              <a:rPr lang="pt-BR" sz="2700" dirty="0" smtClean="0">
-                <a:solidFill>
-                  <a:schemeClr val="bg1">
-                    <a:lumMod val="65000"/>
-                  </a:schemeClr>
-                </a:solidFill>
-                <a:latin typeface="Arial Black" panose="020B0A04020102020204" pitchFamily="34" charset="0"/>
-              </a:rPr>
-              <a:t>1.1</a:t>
-            </a:r>
-            <a:r>
-              <a:rPr lang="pt-BR" sz="2200" dirty="0" smtClean="0">
-                <a:solidFill>
-                  <a:schemeClr val="bg1">
-                    <a:lumMod val="65000"/>
-                  </a:schemeClr>
-                </a:solidFill>
-                <a:latin typeface="Arial Black" panose="020B0A04020102020204" pitchFamily="34" charset="0"/>
-              </a:rPr>
-              <a:t> </a:t>
-            </a:r>
-            <a:r>
-              <a:rPr lang="pt-BR" dirty="0" err="1" smtClean="0">
-                <a:latin typeface="Arial Black" panose="020B0A04020102020204" pitchFamily="34" charset="0"/>
-              </a:rPr>
-              <a:t>PageFactory</a:t>
-            </a:r>
+            <a:endParaRPr lang="pt-BR" dirty="0" err="1"/>
+          </a:p>
+          <a:p>
+            <a:pPr marL="0" indent="0">
+              <a:buNone/>
+            </a:pPr>
+            <a:r>
+              <a:rPr lang="pt-BR" dirty="0">
+                <a:hlinkClick r:id="rId2"/>
+              </a:rPr>
+              <a:t>https://automacaoforadacaixa.wordpress.com/2017/05/01/1-configuracao-ambiente-selenium-e-cucumber</a:t>
+            </a:r>
+            <a:r>
+              <a:rPr lang="pt-BR" dirty="0" smtClean="0">
+                <a:hlinkClick r:id="rId2"/>
+              </a:rPr>
+              <a:t>/</a:t>
+            </a:r>
+            <a:endParaRPr lang="pt-BR" dirty="0" smtClean="0"/>
+          </a:p>
+          <a:p>
+            <a:pPr marL="0" indent="0">
+              <a:buNone/>
+            </a:pPr>
             <a:endParaRPr lang="pt-BR" dirty="0"/>
           </a:p>
-        </p:txBody>
-      </p:sp>
+          <a:p>
+            <a:r>
+              <a:rPr lang="pt-BR" dirty="0" smtClean="0"/>
+              <a:t>Passo a passo detalhado para configuração de ambiente, </a:t>
+            </a:r>
+            <a:r>
+              <a:rPr lang="pt-BR" dirty="0" err="1" smtClean="0"/>
+              <a:t>cucumber</a:t>
+            </a:r>
+            <a:r>
+              <a:rPr lang="pt-BR" dirty="0" smtClean="0"/>
+              <a:t>, </a:t>
+            </a:r>
+            <a:r>
+              <a:rPr lang="pt-BR" dirty="0" err="1" smtClean="0"/>
+              <a:t>selenium</a:t>
+            </a:r>
+            <a:r>
+              <a:rPr lang="pt-BR" dirty="0" smtClean="0"/>
+              <a:t>, logs, com </a:t>
+            </a:r>
+            <a:r>
+              <a:rPr lang="pt-BR" dirty="0" err="1" smtClean="0"/>
+              <a:t>prints</a:t>
+            </a:r>
+            <a:r>
+              <a:rPr lang="pt-BR" dirty="0" smtClean="0"/>
+              <a:t> e exercícios para praticar</a:t>
+            </a:r>
+          </a:p>
+        </p:txBody>
+      </p:sp>
+      <p:pic>
+        <p:nvPicPr>
+          <p:cNvPr id="2" name="Imagem 1"/>
+          <p:cNvPicPr>
+            <a:picLocks noChangeAspect="1"/>
+          </p:cNvPicPr>
+          <p:nvPr/>
+        </p:nvPicPr>
+        <p:blipFill>
+          <a:blip r:embed="rId3"/>
+          <a:stretch>
+            <a:fillRect/>
+          </a:stretch>
+        </p:blipFill>
+        <p:spPr>
+          <a:xfrm>
+            <a:off x="2452938" y="1767222"/>
+            <a:ext cx="7077428" cy="1737187"/>
+          </a:xfrm>
+          <a:prstGeom prst="rect">
+            <a:avLst/>
+          </a:prstGeom>
+        </p:spPr>
+      </p:pic>
     </p:spTree>
     <p:extLst>
       <p:ext uri="{BB962C8B-B14F-4D97-AF65-F5344CB8AC3E}">
-        <p14:creationId xmlns:p14="http://schemas.microsoft.com/office/powerpoint/2010/main" val="317352726"/>
+        <p14:creationId xmlns:p14="http://schemas.microsoft.com/office/powerpoint/2010/main" val="3654481959"/>
       </p:ext>
     </p:extLst>
   </p:cSld>
@@ -9681,47 +9643,10 @@
             <a:spLocks noGrp="1"/>
           </p:cNvSpPr>
           <p:nvPr>
-            <p:ph type="title"/>
+            <p:ph type="ctrTitle"/>
           </p:nvPr>
         </p:nvSpPr>
-        <p:spPr>
-          <a:xfrm>
-            <a:off x="465221" y="210579"/>
-            <a:ext cx="11309684" cy="1030288"/>
-          </a:xfrm>
-        </p:spPr>
-        <p:txBody>
-          <a:bodyPr/>
-          <a:lstStyle/>
-          <a:p>
-            <a:r>
-              <a:rPr lang="pt-BR" dirty="0" err="1" smtClean="0"/>
-              <a:t>PageFactory</a:t>
-            </a:r>
-            <a:endParaRPr lang="pt-BR" b="0" dirty="0">
-              <a:solidFill>
-                <a:srgbClr val="FBB041"/>
-              </a:solidFill>
-            </a:endParaRPr>
-          </a:p>
-        </p:txBody>
-      </p:sp>
-      <p:sp>
-        <p:nvSpPr>
-          <p:cNvPr id="5" name="Espaço Reservado para Conteúdo 4"/>
-          <p:cNvSpPr>
-            <a:spLocks noGrp="1"/>
-          </p:cNvSpPr>
-          <p:nvPr>
-            <p:ph sz="half" idx="1"/>
-          </p:nvPr>
-        </p:nvSpPr>
-        <p:spPr>
-          <a:xfrm>
-            <a:off x="7005106" y="1524447"/>
-            <a:ext cx="4676031" cy="4425592"/>
-          </a:xfrm>
-        </p:spPr>
+        <p:spPr/>
         <p:txBody>
           <a:bodyPr>
             <a:normAutofit/>
@@ -9729,226 +9654,41 @@
           <a:lstStyle/>
           <a:p>
             <a:r>
-              <a:rPr lang="pt-BR" dirty="0" smtClean="0"/>
-              <a:t>Utilize </a:t>
-            </a:r>
-            <a:r>
-              <a:rPr lang="pt-BR" dirty="0" smtClean="0">
-                <a:latin typeface="Consolas" panose="020B0609020204030204" pitchFamily="49" charset="0"/>
-              </a:rPr>
-              <a:t>@</a:t>
+              <a:rPr lang="pt-BR" sz="2700" dirty="0" smtClean="0">
+                <a:solidFill>
+                  <a:schemeClr val="bg1">
+                    <a:lumMod val="65000"/>
+                  </a:schemeClr>
+                </a:solidFill>
+                <a:latin typeface="Arial Black" panose="020B0A04020102020204" pitchFamily="34" charset="0"/>
+              </a:rPr>
+              <a:t>1.1</a:t>
+            </a:r>
+            <a:r>
+              <a:rPr lang="pt-BR" sz="2200" dirty="0" smtClean="0">
+                <a:solidFill>
+                  <a:schemeClr val="bg1">
+                    <a:lumMod val="65000"/>
+                  </a:schemeClr>
+                </a:solidFill>
+                <a:latin typeface="Arial Black" panose="020B0A04020102020204" pitchFamily="34" charset="0"/>
+              </a:rPr>
+              <a:t> </a:t>
             </a:r>
             <a:r>
               <a:rPr lang="pt-BR" dirty="0" err="1" smtClean="0">
-                <a:latin typeface="Consolas" panose="020B0609020204030204" pitchFamily="49" charset="0"/>
-              </a:rPr>
-              <a:t>FindBy</a:t>
-            </a:r>
-            <a:r>
-              <a:rPr lang="pt-BR" dirty="0" smtClean="0"/>
-              <a:t> para identificar os elementos</a:t>
-            </a:r>
-          </a:p>
-          <a:p>
-            <a:r>
-              <a:rPr lang="pt-BR" dirty="0" smtClean="0"/>
-              <a:t>Quando o elemento possuir ID ou </a:t>
-            </a:r>
-            <a:r>
-              <a:rPr lang="pt-BR" dirty="0" err="1" smtClean="0"/>
-              <a:t>Name</a:t>
-            </a:r>
-            <a:r>
-              <a:rPr lang="pt-BR" dirty="0" smtClean="0"/>
-              <a:t>, não é necessário utilizar </a:t>
-            </a:r>
-            <a:r>
-              <a:rPr lang="pt-BR" dirty="0" smtClean="0">
-                <a:latin typeface="Consolas" panose="020B0609020204030204" pitchFamily="49" charset="0"/>
-              </a:rPr>
-              <a:t>@</a:t>
-            </a:r>
-            <a:r>
-              <a:rPr lang="pt-BR" dirty="0" err="1" smtClean="0">
-                <a:latin typeface="Consolas" panose="020B0609020204030204" pitchFamily="49" charset="0"/>
-              </a:rPr>
-              <a:t>FindBy</a:t>
-            </a:r>
-            <a:r>
-              <a:rPr lang="pt-BR" dirty="0" smtClean="0"/>
-              <a:t>, é só declarar a variável com nome igual ao </a:t>
-            </a:r>
-            <a:r>
-              <a:rPr lang="pt-BR" dirty="0" smtClean="0">
-                <a:latin typeface="Consolas" panose="020B0609020204030204" pitchFamily="49" charset="0"/>
-              </a:rPr>
-              <a:t>ID</a:t>
-            </a:r>
-            <a:r>
-              <a:rPr lang="pt-BR" dirty="0" smtClean="0"/>
-              <a:t> ou </a:t>
-            </a:r>
-            <a:r>
-              <a:rPr lang="pt-BR" dirty="0" err="1" smtClean="0">
-                <a:latin typeface="Consolas" panose="020B0609020204030204" pitchFamily="49" charset="0"/>
-              </a:rPr>
-              <a:t>Name</a:t>
-            </a:r>
-            <a:r>
-              <a:rPr lang="pt-BR" dirty="0" smtClean="0"/>
-              <a:t> do elemento</a:t>
-            </a:r>
-          </a:p>
-          <a:p>
-            <a:r>
-              <a:rPr lang="pt-BR" dirty="0" smtClean="0"/>
-              <a:t>É necessário iniciar os elementos através do método </a:t>
-            </a:r>
-            <a:r>
-              <a:rPr lang="pt-BR" sz="2000" dirty="0" err="1" smtClean="0">
-                <a:latin typeface="Consolas" panose="020B0609020204030204" pitchFamily="49" charset="0"/>
-              </a:rPr>
-              <a:t>PageFactory.initElements</a:t>
-            </a:r>
-            <a:r>
-              <a:rPr lang="pt-BR" sz="2000" dirty="0" smtClean="0">
-                <a:latin typeface="Consolas" panose="020B0609020204030204" pitchFamily="49" charset="0"/>
-              </a:rPr>
-              <a:t>()</a:t>
-            </a:r>
-          </a:p>
-        </p:txBody>
-      </p:sp>
-      <p:pic>
-        <p:nvPicPr>
-          <p:cNvPr id="9" name="Imagem 8"/>
-          <p:cNvPicPr>
-            <a:picLocks noChangeAspect="1"/>
-          </p:cNvPicPr>
-          <p:nvPr/>
-        </p:nvPicPr>
-        <p:blipFill>
-          <a:blip r:embed="rId2"/>
-          <a:stretch>
-            <a:fillRect/>
-          </a:stretch>
-        </p:blipFill>
-        <p:spPr>
-          <a:xfrm>
-            <a:off x="204678" y="1492136"/>
-            <a:ext cx="6539885" cy="3247287"/>
-          </a:xfrm>
-          <a:prstGeom prst="rect">
-            <a:avLst/>
-          </a:prstGeom>
-          <a:ln>
-            <a:noFill/>
-          </a:ln>
-          <a:effectLst>
-            <a:outerShdw blurRad="292100" dist="139700" dir="2700000" algn="tl" rotWithShape="0">
-              <a:srgbClr val="333333">
-                <a:alpha val="65000"/>
-              </a:srgbClr>
-            </a:outerShdw>
-          </a:effectLst>
-        </p:spPr>
-      </p:pic>
-      <p:sp>
-        <p:nvSpPr>
-          <p:cNvPr id="7" name="Retângulo 6"/>
-          <p:cNvSpPr/>
-          <p:nvPr/>
-        </p:nvSpPr>
-        <p:spPr>
-          <a:xfrm>
-            <a:off x="490978" y="1867437"/>
-            <a:ext cx="4827996" cy="837127"/>
-          </a:xfrm>
-          <a:prstGeom prst="rect">
-            <a:avLst/>
-          </a:prstGeom>
-          <a:noFill/>
-          <a:ln>
-            <a:solidFill>
-              <a:srgbClr val="FF0000"/>
-            </a:solidFill>
-          </a:ln>
-        </p:spPr>
-        <p:style>
-          <a:lnRef idx="2">
-            <a:schemeClr val="accent1">
-              <a:shade val="50000"/>
-            </a:schemeClr>
-          </a:lnRef>
-          <a:fillRef idx="1">
-            <a:schemeClr val="accent1"/>
-          </a:fillRef>
-          <a:effectRef idx="0">
-            <a:schemeClr val="accent1"/>
-          </a:effectRef>
-          <a:fontRef idx="minor">
-            <a:schemeClr val="lt1"/>
-          </a:fontRef>
-        </p:style>
-        <p:txBody>
-          <a:bodyPr rtlCol="0" anchor="ctr"/>
-          <a:lstStyle/>
-          <a:p>
-            <a:pPr algn="ctr"/>
-            <a:endParaRPr lang="pt-BR"/>
-          </a:p>
-        </p:txBody>
-      </p:sp>
-      <p:sp>
-        <p:nvSpPr>
-          <p:cNvPr id="10" name="Retângulo 9"/>
-          <p:cNvSpPr/>
-          <p:nvPr/>
-        </p:nvSpPr>
-        <p:spPr>
-          <a:xfrm>
-            <a:off x="965351" y="3060376"/>
-            <a:ext cx="5779212" cy="319826"/>
-          </a:xfrm>
-          <a:prstGeom prst="rect">
-            <a:avLst/>
-          </a:prstGeom>
-          <a:noFill/>
-          <a:ln>
-            <a:solidFill>
-              <a:srgbClr val="FF0000"/>
-            </a:solidFill>
-          </a:ln>
-        </p:spPr>
-        <p:style>
-          <a:lnRef idx="2">
-            <a:schemeClr val="accent1">
-              <a:shade val="50000"/>
-            </a:schemeClr>
-          </a:lnRef>
-          <a:fillRef idx="1">
-            <a:schemeClr val="accent1"/>
-          </a:fillRef>
-          <a:effectRef idx="0">
-            <a:schemeClr val="accent1"/>
-          </a:effectRef>
-          <a:fontRef idx="minor">
-            <a:schemeClr val="lt1"/>
-          </a:fontRef>
-        </p:style>
-        <p:txBody>
-          <a:bodyPr rtlCol="0" anchor="ctr"/>
-          <a:lstStyle/>
-          <a:p>
-            <a:pPr algn="ctr"/>
-            <a:endParaRPr lang="pt-BR"/>
+                <a:latin typeface="Arial Black" panose="020B0A04020102020204" pitchFamily="34" charset="0"/>
+              </a:rPr>
+              <a:t>PageFactory</a:t>
+            </a:r>
+            <a:endParaRPr lang="pt-BR" dirty="0"/>
           </a:p>
         </p:txBody>
       </p:sp>
     </p:spTree>
     <p:extLst>
       <p:ext uri="{BB962C8B-B14F-4D97-AF65-F5344CB8AC3E}">
-        <p14:creationId xmlns:p14="http://schemas.microsoft.com/office/powerpoint/2010/main" val="302312829"/>
+        <p14:creationId xmlns:p14="http://schemas.microsoft.com/office/powerpoint/2010/main" val="317352726"/>
       </p:ext>
     </p:extLst>
   </p:cSld>
@@ -9989,10 +9729,47 @@
             <a:spLocks noGrp="1"/>
           </p:cNvSpPr>
           <p:nvPr>
-            <p:ph type="ctrTitle"/>
+            <p:ph type="title"/>
           </p:nvPr>
         </p:nvSpPr>
-        <p:spPr/>
+        <p:spPr>
+          <a:xfrm>
+            <a:off x="465221" y="210579"/>
+            <a:ext cx="11309684" cy="1030288"/>
+          </a:xfrm>
+        </p:spPr>
+        <p:txBody>
+          <a:bodyPr/>
+          <a:lstStyle/>
+          <a:p>
+            <a:r>
+              <a:rPr lang="pt-BR" dirty="0" err="1" smtClean="0"/>
+              <a:t>PageFactory</a:t>
+            </a:r>
+            <a:endParaRPr lang="pt-BR" b="0" dirty="0">
+              <a:solidFill>
+                <a:srgbClr val="FBB041"/>
+              </a:solidFill>
+            </a:endParaRPr>
+          </a:p>
+        </p:txBody>
+      </p:sp>
+      <p:sp>
+        <p:nvSpPr>
+          <p:cNvPr id="5" name="Espaço Reservado para Conteúdo 4"/>
+          <p:cNvSpPr>
+            <a:spLocks noGrp="1"/>
+          </p:cNvSpPr>
+          <p:nvPr>
+            <p:ph sz="half" idx="1"/>
+          </p:nvPr>
+        </p:nvSpPr>
+        <p:spPr>
+          <a:xfrm>
+            <a:off x="7005106" y="1524447"/>
+            <a:ext cx="4676031" cy="4425592"/>
+          </a:xfrm>
+        </p:spPr>
         <p:txBody>
           <a:bodyPr>
             <a:normAutofit/>
@@ -10000,39 +9777,226 @@
           <a:lstStyle/>
           <a:p>
             <a:r>
-              <a:rPr lang="pt-BR" sz="2700" dirty="0" smtClean="0">
-                <a:solidFill>
-                  <a:schemeClr val="bg1">
-                    <a:lumMod val="65000"/>
-                  </a:schemeClr>
-                </a:solidFill>
-                <a:latin typeface="Arial Black" panose="020B0A04020102020204" pitchFamily="34" charset="0"/>
-              </a:rPr>
-              <a:t>1.2</a:t>
-            </a:r>
-            <a:r>
-              <a:rPr lang="pt-BR" sz="2200" dirty="0" smtClean="0">
-                <a:solidFill>
-                  <a:schemeClr val="bg1">
-                    <a:lumMod val="65000"/>
-                  </a:schemeClr>
-                </a:solidFill>
-                <a:latin typeface="Arial Black" panose="020B0A04020102020204" pitchFamily="34" charset="0"/>
-              </a:rPr>
-              <a:t> </a:t>
-            </a:r>
-            <a:r>
               <a:rPr lang="pt-BR" dirty="0" smtClean="0"/>
-              <a:t>Desafio 1</a:t>
-            </a:r>
-            <a:endParaRPr lang="pt-BR" dirty="0"/>
+              <a:t>Utilize </a:t>
+            </a:r>
+            <a:r>
+              <a:rPr lang="pt-BR" dirty="0" smtClean="0">
+                <a:latin typeface="Consolas" panose="020B0609020204030204" pitchFamily="49" charset="0"/>
+              </a:rPr>
+              <a:t>@</a:t>
+            </a:r>
+            <a:r>
+              <a:rPr lang="pt-BR" dirty="0" err="1" smtClean="0">
+                <a:latin typeface="Consolas" panose="020B0609020204030204" pitchFamily="49" charset="0"/>
+              </a:rPr>
+              <a:t>FindBy</a:t>
+            </a:r>
+            <a:r>
+              <a:rPr lang="pt-BR" dirty="0" smtClean="0"/>
+              <a:t> para identificar os elementos</a:t>
+            </a:r>
+          </a:p>
+          <a:p>
+            <a:r>
+              <a:rPr lang="pt-BR" dirty="0" smtClean="0"/>
+              <a:t>Quando o elemento possuir ID ou </a:t>
+            </a:r>
+            <a:r>
+              <a:rPr lang="pt-BR" dirty="0" err="1" smtClean="0"/>
+              <a:t>Name</a:t>
+            </a:r>
+            <a:r>
+              <a:rPr lang="pt-BR" dirty="0" smtClean="0"/>
+              <a:t>, não é necessário utilizar </a:t>
+            </a:r>
+            <a:r>
+              <a:rPr lang="pt-BR" dirty="0" smtClean="0">
+                <a:latin typeface="Consolas" panose="020B0609020204030204" pitchFamily="49" charset="0"/>
+              </a:rPr>
+              <a:t>@</a:t>
+            </a:r>
+            <a:r>
+              <a:rPr lang="pt-BR" dirty="0" err="1" smtClean="0">
+                <a:latin typeface="Consolas" panose="020B0609020204030204" pitchFamily="49" charset="0"/>
+              </a:rPr>
+              <a:t>FindBy</a:t>
+            </a:r>
+            <a:r>
+              <a:rPr lang="pt-BR" dirty="0" smtClean="0"/>
+              <a:t>, é só declarar a variável com nome igual ao </a:t>
+            </a:r>
+            <a:r>
+              <a:rPr lang="pt-BR" dirty="0" smtClean="0">
+                <a:latin typeface="Consolas" panose="020B0609020204030204" pitchFamily="49" charset="0"/>
+              </a:rPr>
+              <a:t>ID</a:t>
+            </a:r>
+            <a:r>
+              <a:rPr lang="pt-BR" dirty="0" smtClean="0"/>
+              <a:t> ou </a:t>
+            </a:r>
+            <a:r>
+              <a:rPr lang="pt-BR" dirty="0" err="1" smtClean="0">
+                <a:latin typeface="Consolas" panose="020B0609020204030204" pitchFamily="49" charset="0"/>
+              </a:rPr>
+              <a:t>Name</a:t>
+            </a:r>
+            <a:r>
+              <a:rPr lang="pt-BR" dirty="0" smtClean="0"/>
+              <a:t> do elemento</a:t>
+            </a:r>
+          </a:p>
+          <a:p>
+            <a:r>
+              <a:rPr lang="pt-BR" dirty="0" smtClean="0"/>
+              <a:t>É necessário iniciar os elementos através do método </a:t>
+            </a:r>
+            <a:r>
+              <a:rPr lang="pt-BR" sz="2000" dirty="0" err="1" smtClean="0">
+                <a:latin typeface="Consolas" panose="020B0609020204030204" pitchFamily="49" charset="0"/>
+              </a:rPr>
+              <a:t>PageFactory.initElements</a:t>
+            </a:r>
+            <a:r>
+              <a:rPr lang="pt-BR" sz="2000" dirty="0" smtClean="0">
+                <a:latin typeface="Consolas" panose="020B0609020204030204" pitchFamily="49" charset="0"/>
+              </a:rPr>
+              <a:t>()</a:t>
+            </a:r>
+          </a:p>
+        </p:txBody>
+      </p:sp>
+      <p:pic>
+        <p:nvPicPr>
+          <p:cNvPr id="9" name="Imagem 8"/>
+          <p:cNvPicPr>
+            <a:picLocks noChangeAspect="1"/>
+          </p:cNvPicPr>
+          <p:nvPr/>
+        </p:nvPicPr>
+        <p:blipFill>
+          <a:blip r:embed="rId2"/>
+          <a:stretch>
+            <a:fillRect/>
+          </a:stretch>
+        </p:blipFill>
+        <p:spPr>
+          <a:xfrm>
+            <a:off x="204678" y="1492136"/>
+            <a:ext cx="6539885" cy="3247287"/>
+          </a:xfrm>
+          <a:prstGeom prst="rect">
+            <a:avLst/>
+          </a:prstGeom>
+          <a:ln>
+            <a:noFill/>
+          </a:ln>
+          <a:effectLst>
+            <a:outerShdw blurRad="292100" dist="139700" dir="2700000" algn="tl" rotWithShape="0">
+              <a:srgbClr val="333333">
+                <a:alpha val="65000"/>
+              </a:srgbClr>
+            </a:outerShdw>
+          </a:effectLst>
+        </p:spPr>
+      </p:pic>
+      <p:sp>
+        <p:nvSpPr>
+          <p:cNvPr id="7" name="Retângulo 6"/>
+          <p:cNvSpPr/>
+          <p:nvPr/>
+        </p:nvSpPr>
+        <p:spPr>
+          <a:xfrm>
+            <a:off x="490978" y="1867437"/>
+            <a:ext cx="4827996" cy="837127"/>
+          </a:xfrm>
+          <a:prstGeom prst="rect">
+            <a:avLst/>
+          </a:prstGeom>
+          <a:noFill/>
+          <a:ln>
+            <a:solidFill>
+              <a:srgbClr val="FF0000"/>
+            </a:solidFill>
+          </a:ln>
+        </p:spPr>
+        <p:style>
+          <a:lnRef idx="2">
+            <a:schemeClr val="accent1">
+              <a:shade val="50000"/>
+            </a:schemeClr>
+          </a:lnRef>
+          <a:fillRef idx="1">
+            <a:schemeClr val="accent1"/>
+          </a:fillRef>
+          <a:effectRef idx="0">
+            <a:schemeClr val="accent1"/>
+          </a:effectRef>
+          <a:fontRef idx="minor">
+            <a:schemeClr val="lt1"/>
+          </a:fontRef>
+        </p:style>
+        <p:txBody>
+          <a:bodyPr rtlCol="0" anchor="ctr"/>
+          <a:lstStyle/>
+          <a:p>
+            <a:pPr algn="ctr"/>
+            <a:endParaRPr lang="pt-BR"/>
+          </a:p>
+        </p:txBody>
+      </p:sp>
+      <p:sp>
+        <p:nvSpPr>
+          <p:cNvPr id="10" name="Retângulo 9"/>
+          <p:cNvSpPr/>
+          <p:nvPr/>
+        </p:nvSpPr>
+        <p:spPr>
+          <a:xfrm>
+            <a:off x="965351" y="3060376"/>
+            <a:ext cx="5779212" cy="319826"/>
+          </a:xfrm>
+          <a:prstGeom prst="rect">
+            <a:avLst/>
+          </a:prstGeom>
+          <a:noFill/>
+          <a:ln>
+            <a:solidFill>
+              <a:srgbClr val="FF0000"/>
+            </a:solidFill>
+          </a:ln>
+        </p:spPr>
+        <p:style>
+          <a:lnRef idx="2">
+            <a:schemeClr val="accent1">
+              <a:shade val="50000"/>
+            </a:schemeClr>
+          </a:lnRef>
+          <a:fillRef idx="1">
+            <a:schemeClr val="accent1"/>
+          </a:fillRef>
+          <a:effectRef idx="0">
+            <a:schemeClr val="accent1"/>
+          </a:effectRef>
+          <a:fontRef idx="minor">
+            <a:schemeClr val="lt1"/>
+          </a:fontRef>
+        </p:style>
+        <p:txBody>
+          <a:bodyPr rtlCol="0" anchor="ctr"/>
+          <a:lstStyle/>
+          <a:p>
+            <a:pPr algn="ctr"/>
+            <a:endParaRPr lang="pt-BR"/>
           </a:p>
         </p:txBody>
       </p:sp>
     </p:spTree>
     <p:extLst>
       <p:ext uri="{BB962C8B-B14F-4D97-AF65-F5344CB8AC3E}">
-        <p14:creationId xmlns:p14="http://schemas.microsoft.com/office/powerpoint/2010/main" val="1240896282"/>
+        <p14:creationId xmlns:p14="http://schemas.microsoft.com/office/powerpoint/2010/main" val="302312829"/>
       </p:ext>
     </p:extLst>
   </p:cSld>
@@ -10068,101 +10032,43 @@
       </p:grpSpPr>
       <p:sp>
         <p:nvSpPr>
-          <p:cNvPr id="5" name="Espaço Reservado para Conteúdo 4"/>
+          <p:cNvPr id="4" name="Título 3"/>
           <p:cNvSpPr>
             <a:spLocks noGrp="1"/>
           </p:cNvSpPr>
           <p:nvPr>
-            <p:ph sz="half" idx="1"/>
+            <p:ph type="ctrTitle"/>
           </p:nvPr>
         </p:nvSpPr>
-        <p:spPr>
-          <a:xfrm>
-            <a:off x="464714" y="1825625"/>
-            <a:ext cx="11103172" cy="4351338"/>
-          </a:xfrm>
-        </p:spPr>
+        <p:spPr/>
         <p:txBody>
           <a:bodyPr>
             <a:normAutofit/>
           </a:bodyPr>
           <a:lstStyle/>
           <a:p>
-            <a:pPr marL="457200" indent="-457200">
-              <a:buFont typeface="+mj-lt"/>
-              <a:buAutoNum type="arabicPeriod"/>
-            </a:pPr>
-            <a:r>
-              <a:rPr lang="pt-BR" sz="2800" dirty="0" smtClean="0"/>
-              <a:t>Cenário 1: Enviar mensagem através do menu </a:t>
-            </a:r>
-            <a:r>
-              <a:rPr lang="pt-BR" sz="2800" dirty="0" err="1" smtClean="0"/>
-              <a:t>Contact</a:t>
-            </a:r>
-            <a:r>
-              <a:rPr lang="pt-BR" sz="2800" dirty="0" smtClean="0"/>
+            <a:r>
+              <a:rPr lang="pt-BR" sz="2700" dirty="0" smtClean="0">
+                <a:solidFill>
+                  <a:schemeClr val="bg1">
+                    <a:lumMod val="65000"/>
+                  </a:schemeClr>
+                </a:solidFill>
+                <a:latin typeface="Arial Black" panose="020B0A04020102020204" pitchFamily="34" charset="0"/>
+              </a:rPr>
+              <a:t>1.2</a:t>
+            </a:r>
+            <a:r>
+              <a:rPr lang="pt-BR" sz="2200" dirty="0" smtClean="0">
+                <a:solidFill>
+                  <a:schemeClr val="bg1">
+                    <a:lumMod val="65000"/>
+                  </a:schemeClr>
+                </a:solidFill>
+                <a:latin typeface="Arial Black" panose="020B0A04020102020204" pitchFamily="34" charset="0"/>
+              </a:rPr>
               <a:t> </a:t>
             </a:r>
-            <a:r>
-              <a:rPr lang="pt-BR" sz="2800" dirty="0" err="1" smtClean="0"/>
-              <a:t>Us</a:t>
-            </a:r>
-            <a:endParaRPr lang="pt-BR" sz="2800" dirty="0" smtClean="0"/>
-          </a:p>
-          <a:p>
-            <a:pPr marL="457200" indent="-457200">
-              <a:buFont typeface="+mj-lt"/>
-              <a:buAutoNum type="arabicPeriod"/>
-            </a:pPr>
-            <a:endParaRPr lang="pt-BR" sz="2800" dirty="0"/>
-          </a:p>
-          <a:p>
-            <a:pPr marL="457200" indent="-457200">
-              <a:buFont typeface="+mj-lt"/>
-              <a:buAutoNum type="arabicPeriod"/>
-            </a:pPr>
-            <a:r>
-              <a:rPr lang="pt-BR" sz="2800" dirty="0" smtClean="0"/>
-              <a:t>Cenário 2: Adicionar Produto ao Carrinho</a:t>
-            </a:r>
-            <a:endParaRPr lang="pt-BR" sz="2800" dirty="0" smtClean="0"/>
-          </a:p>
-          <a:p>
-            <a:pPr marL="457200" indent="-457200">
-              <a:buFont typeface="+mj-lt"/>
-              <a:buAutoNum type="arabicPeriod"/>
-            </a:pPr>
-            <a:endParaRPr lang="pt-BR" sz="2800" b="1" dirty="0"/>
-          </a:p>
-          <a:p>
-            <a:pPr marL="457200" indent="-457200">
-              <a:buFont typeface="+mj-lt"/>
-              <a:buAutoNum type="arabicPeriod"/>
-            </a:pPr>
-            <a:r>
-              <a:rPr lang="pt-BR" sz="2800" dirty="0" smtClean="0"/>
-              <a:t>Cenário 3: Efetuar Cadastro</a:t>
-            </a:r>
-            <a:endParaRPr lang="pt-BR" sz="2800" dirty="0" smtClean="0"/>
-          </a:p>
-        </p:txBody>
-      </p:sp>
-      <p:sp>
-        <p:nvSpPr>
-          <p:cNvPr id="2" name="Título 1"/>
-          <p:cNvSpPr>
-            <a:spLocks noGrp="1"/>
-          </p:cNvSpPr>
-          <p:nvPr>
-            <p:ph type="title"/>
-          </p:nvPr>
-        </p:nvSpPr>
-        <p:spPr/>
-        <p:txBody>
-          <a:bodyPr/>
-          <a:lstStyle/>
-          <a:p>
             <a:r>
               <a:rPr lang="pt-BR" dirty="0" smtClean="0"/>
               <a:t>Desafio 1</a:t>
@@ -10174,7 +10080,7 @@
     </p:spTree>
     <p:extLst>
       <p:ext uri="{BB962C8B-B14F-4D97-AF65-F5344CB8AC3E}">
-        <p14:creationId xmlns:p14="http://schemas.microsoft.com/office/powerpoint/2010/main" val="2895100178"/>
+        <p14:creationId xmlns:p14="http://schemas.microsoft.com/office/powerpoint/2010/main" val="1240896282"/>
       </p:ext>
     </p:extLst>
   </p:cSld>
@@ -10210,46 +10116,102 @@
       </p:grpSpPr>
       <p:sp>
         <p:nvSpPr>
-          <p:cNvPr id="4" name="Título 3"/>
+          <p:cNvPr id="5" name="Espaço Reservado para Conteúdo 4"/>
           <p:cNvSpPr>
             <a:spLocks noGrp="1"/>
           </p:cNvSpPr>
           <p:nvPr>
-            <p:ph type="ctrTitle"/>
+            <p:ph sz="half" idx="1"/>
           </p:nvPr>
         </p:nvSpPr>
-        <p:spPr/>
+        <p:spPr>
+          <a:xfrm>
+            <a:off x="464714" y="1825625"/>
+            <a:ext cx="11103172" cy="4351338"/>
+          </a:xfrm>
+        </p:spPr>
         <p:txBody>
           <a:bodyPr>
             <a:normAutofit/>
           </a:bodyPr>
           <a:lstStyle/>
           <a:p>
-            <a:r>
-              <a:rPr lang="pt-BR" sz="2700" dirty="0" smtClean="0">
-                <a:solidFill>
-                  <a:schemeClr val="bg1">
-                    <a:lumMod val="65000"/>
-                  </a:schemeClr>
-                </a:solidFill>
-                <a:latin typeface="Arial Black" panose="020B0A04020102020204" pitchFamily="34" charset="0"/>
-              </a:rPr>
-              <a:t>2.0</a:t>
-            </a:r>
-            <a:r>
-              <a:rPr lang="pt-BR" sz="2200" dirty="0" smtClean="0">
-                <a:solidFill>
-                  <a:schemeClr val="bg1">
-                    <a:lumMod val="65000"/>
-                  </a:schemeClr>
-                </a:solidFill>
-                <a:latin typeface="Arial Black" panose="020B0A04020102020204" pitchFamily="34" charset="0"/>
-              </a:rPr>
+            <a:pPr marL="457200" indent="-457200">
+              <a:buFont typeface="+mj-lt"/>
+              <a:buAutoNum type="arabicPeriod"/>
+            </a:pPr>
+            <a:r>
+              <a:rPr lang="pt-BR" sz="2800" dirty="0" smtClean="0"/>
+              <a:t>Cenário 1: Enviar mensagem através do menu </a:t>
+            </a:r>
+            <a:r>
+              <a:rPr lang="pt-BR" sz="2800" dirty="0" err="1" smtClean="0"/>
+              <a:t>Contact</a:t>
+            </a:r>
+            <a:r>
+              <a:rPr lang="pt-BR" sz="2800" dirty="0" smtClean="0"/>
               <a:t> </a:t>
             </a:r>
             <a:r>
-              <a:rPr lang="pt-BR" dirty="0" err="1"/>
-              <a:t>Reports</a:t>
+              <a:rPr lang="pt-BR" sz="2800" dirty="0" err="1" smtClean="0"/>
+              <a:t>Us</a:t>
+            </a:r>
+            <a:endParaRPr lang="pt-BR" sz="2800" dirty="0" smtClean="0"/>
+          </a:p>
+          <a:p>
+            <a:pPr marL="457200" indent="-457200">
+              <a:buFont typeface="+mj-lt"/>
+              <a:buAutoNum type="arabicPeriod"/>
+            </a:pPr>
+            <a:endParaRPr lang="pt-BR" sz="2800" dirty="0"/>
+          </a:p>
+          <a:p>
+            <a:pPr marL="457200" indent="-457200">
+              <a:buFont typeface="+mj-lt"/>
+              <a:buAutoNum type="arabicPeriod"/>
+            </a:pPr>
+            <a:r>
+              <a:rPr lang="pt-BR" sz="2800" dirty="0" smtClean="0"/>
+              <a:t>Cenário 2: Adicionar Produto ao Carrinho</a:t>
+            </a:r>
+          </a:p>
+          <a:p>
+            <a:pPr marL="457200" indent="-457200">
+              <a:buFont typeface="+mj-lt"/>
+              <a:buAutoNum type="arabicPeriod"/>
+            </a:pPr>
+            <a:endParaRPr lang="pt-BR" sz="2800" b="1" dirty="0"/>
+          </a:p>
+          <a:p>
+            <a:pPr marL="457200" indent="-457200">
+              <a:buFont typeface="+mj-lt"/>
+              <a:buAutoNum type="arabicPeriod"/>
+            </a:pPr>
+            <a:r>
+              <a:rPr lang="pt-BR" sz="2800" dirty="0" smtClean="0"/>
+              <a:t>Cenário 3: Efetuar Cadastro</a:t>
+            </a:r>
+          </a:p>
+        </p:txBody>
+      </p:sp>
+      <p:sp>
+        <p:nvSpPr>
+          <p:cNvPr id="2" name="Título 1"/>
+          <p:cNvSpPr>
+            <a:spLocks noGrp="1"/>
+          </p:cNvSpPr>
+          <p:nvPr>
+            <p:ph type="title"/>
+          </p:nvPr>
+        </p:nvSpPr>
+        <p:spPr/>
+        <p:txBody>
+          <a:bodyPr/>
+          <a:lstStyle/>
+          <a:p>
+            <a:r>
+              <a:rPr lang="pt-BR" dirty="0" smtClean="0"/>
+              <a:t>Desafio 1</a:t>
             </a:r>
             <a:endParaRPr lang="pt-BR" dirty="0"/>
           </a:p>
@@ -10258,7 +10220,7 @@
     </p:spTree>
     <p:extLst>
       <p:ext uri="{BB962C8B-B14F-4D97-AF65-F5344CB8AC3E}">
-        <p14:creationId xmlns:p14="http://schemas.microsoft.com/office/powerpoint/2010/main" val="3016654703"/>
+        <p14:creationId xmlns:p14="http://schemas.microsoft.com/office/powerpoint/2010/main" val="2895100178"/>
       </p:ext>
     </p:extLst>
   </p:cSld>
@@ -10627,6 +10589,90 @@
       </p:grpSpPr>
       <p:sp>
         <p:nvSpPr>
+          <p:cNvPr id="4" name="Título 3"/>
+          <p:cNvSpPr>
+            <a:spLocks noGrp="1"/>
+          </p:cNvSpPr>
+          <p:nvPr>
+            <p:ph type="ctrTitle"/>
+          </p:nvPr>
+        </p:nvSpPr>
+        <p:spPr/>
+        <p:txBody>
+          <a:bodyPr>
+            <a:normAutofit/>
+          </a:bodyPr>
+          <a:lstStyle/>
+          <a:p>
+            <a:r>
+              <a:rPr lang="pt-BR" sz="2700" dirty="0" smtClean="0">
+                <a:solidFill>
+                  <a:schemeClr val="bg1">
+                    <a:lumMod val="65000"/>
+                  </a:schemeClr>
+                </a:solidFill>
+                <a:latin typeface="Arial Black" panose="020B0A04020102020204" pitchFamily="34" charset="0"/>
+              </a:rPr>
+              <a:t>2.0</a:t>
+            </a:r>
+            <a:r>
+              <a:rPr lang="pt-BR" sz="2200" dirty="0" smtClean="0">
+                <a:solidFill>
+                  <a:schemeClr val="bg1">
+                    <a:lumMod val="65000"/>
+                  </a:schemeClr>
+                </a:solidFill>
+                <a:latin typeface="Arial Black" panose="020B0A04020102020204" pitchFamily="34" charset="0"/>
+              </a:rPr>
+              <a:t> </a:t>
+            </a:r>
+            <a:r>
+              <a:rPr lang="pt-BR" dirty="0" err="1"/>
+              <a:t>Reports</a:t>
+            </a:r>
+            <a:endParaRPr lang="pt-BR" dirty="0"/>
+          </a:p>
+        </p:txBody>
+      </p:sp>
+    </p:spTree>
+    <p:extLst>
+      <p:ext uri="{BB962C8B-B14F-4D97-AF65-F5344CB8AC3E}">
+        <p14:creationId xmlns:p14="http://schemas.microsoft.com/office/powerpoint/2010/main" val="3016654703"/>
+      </p:ext>
+    </p:extLst>
+  </p:cSld>
+  <p:clrMapOvr>
+    <a:masterClrMapping/>
+  </p:clrMapOvr>
+  <p:timing>
+    <p:tnLst>
+      <p:par>
+        <p:cTn id="1" dur="indefinite" restart="never" nodeType="tmRoot"/>
+      </p:par>
+    </p:tnLst>
+  </p:timing>
+</p:sld>
+</file>
+
+<file path=ppt/slides/slide41.xml><?xml version="1.0" encoding="utf-8"?>
+<p:sld xmlns:a="http://schemas.openxmlformats.org/drawingml/2006/main" xmlns:r="http://schemas.openxmlformats.org/officeDocument/2006/relationships" xmlns:p="http://schemas.openxmlformats.org/presentationml/2006/main">
+  <p:cSld>
+    <p:spTree>
+      <p:nvGrpSpPr>
+        <p:cNvPr id="1" name=""/>
+        <p:cNvGrpSpPr/>
+        <p:nvPr/>
+      </p:nvGrpSpPr>
+      <p:grpSpPr>
+        <a:xfrm>
+          <a:off x="0" y="0"/>
+          <a:ext cx="0" cy="0"/>
+          <a:chOff x="0" y="0"/>
+          <a:chExt cx="0" cy="0"/>
+        </a:xfrm>
+      </p:grpSpPr>
+      <p:sp>
+        <p:nvSpPr>
           <p:cNvPr id="2" name="Título 1"/>
           <p:cNvSpPr>
             <a:spLocks noGrp="1"/>
@@ -10732,10 +10778,17 @@
   <p:clrMapOvr>
     <a:masterClrMapping/>
   </p:clrMapOvr>
+  <p:timing>
+    <p:tnLst>
+      <p:par>
+        <p:cTn id="1" dur="indefinite" restart="never" nodeType="tmRoot"/>
+      </p:par>
+    </p:tnLst>
+  </p:timing>
 </p:sld>
 </file>
 
-<file path=ppt/slides/slide41.xml><?xml version="1.0" encoding="utf-8"?>
+<file path=ppt/slides/slide42.xml><?xml version="1.0" encoding="utf-8"?>
 <p:sld xmlns:a="http://schemas.openxmlformats.org/drawingml/2006/main" xmlns:r="http://schemas.openxmlformats.org/officeDocument/2006/relationships" xmlns:p="http://schemas.openxmlformats.org/presentationml/2006/main">
   <p:cSld>
     <p:spTree>
@@ -10855,10 +10908,17 @@
   <p:clrMapOvr>
     <a:masterClrMapping/>
   </p:clrMapOvr>
+  <p:timing>
+    <p:tnLst>
+      <p:par>
+        <p:cTn id="1" dur="indefinite" restart="never" nodeType="tmRoot"/>
+      </p:par>
+    </p:tnLst>
+  </p:timing>
 </p:sld>
 </file>
 
-<file path=ppt/slides/slide42.xml><?xml version="1.0" encoding="utf-8"?>
+<file path=ppt/slides/slide43.xml><?xml version="1.0" encoding="utf-8"?>
 <p:sld xmlns:a="http://schemas.openxmlformats.org/drawingml/2006/main" xmlns:r="http://schemas.openxmlformats.org/officeDocument/2006/relationships" xmlns:p="http://schemas.openxmlformats.org/presentationml/2006/main">
   <p:cSld>
     <p:spTree>
@@ -10986,167 +11046,13 @@
   <p:clrMapOvr>
     <a:masterClrMapping/>
   </p:clrMapOvr>
-</p:sld>
-</file>
-
-<file path=ppt/slides/slide43.xml><?xml version="1.0" encoding="utf-8"?>
-<p:sld xmlns:a="http://schemas.openxmlformats.org/drawingml/2006/main" xmlns:r="http://schemas.openxmlformats.org/officeDocument/2006/relationships" xmlns:p="http://schemas.openxmlformats.org/presentationml/2006/main">
-  <p:cSld>
-    <p:spTree>
-      <p:nvGrpSpPr>
-        <p:cNvPr id="1" name=""/>
-        <p:cNvGrpSpPr/>
-        <p:nvPr/>
-      </p:nvGrpSpPr>
-      <p:grpSpPr>
-        <a:xfrm>
-          <a:off x="0" y="0"/>
-          <a:ext cx="0" cy="0"/>
-          <a:chOff x="0" y="0"/>
-          <a:chExt cx="0" cy="0"/>
-        </a:xfrm>
-      </p:grpSpPr>
-      <p:sp>
-        <p:nvSpPr>
-          <p:cNvPr id="2" name="Título 1"/>
-          <p:cNvSpPr>
-            <a:spLocks noGrp="1"/>
-          </p:cNvSpPr>
-          <p:nvPr>
-            <p:ph type="title"/>
-          </p:nvPr>
-        </p:nvSpPr>
-        <p:spPr/>
-        <p:txBody>
-          <a:bodyPr/>
-          <a:lstStyle/>
-          <a:p>
-            <a:r>
-              <a:rPr lang="pt-BR" dirty="0" smtClean="0"/>
-              <a:t>Evidências em PDF – </a:t>
-            </a:r>
-            <a:r>
-              <a:rPr lang="pt-BR" dirty="0" err="1" smtClean="0">
-                <a:solidFill>
-                  <a:srgbClr val="FFC000"/>
-                </a:solidFill>
-              </a:rPr>
-              <a:t>selenium-java-evidence</a:t>
-            </a:r>
-            <a:endParaRPr lang="pt-BR" dirty="0">
-              <a:solidFill>
-                <a:srgbClr val="FFC000"/>
-              </a:solidFill>
-            </a:endParaRPr>
-          </a:p>
-        </p:txBody>
-      </p:sp>
-      <p:pic>
-        <p:nvPicPr>
-          <p:cNvPr id="6" name="Imagem 5"/>
-          <p:cNvPicPr>
-            <a:picLocks noChangeAspect="1"/>
-          </p:cNvPicPr>
-          <p:nvPr/>
-        </p:nvPicPr>
-        <p:blipFill>
-          <a:blip r:embed="rId2"/>
-          <a:stretch>
-            <a:fillRect/>
-          </a:stretch>
-        </p:blipFill>
-        <p:spPr>
-          <a:xfrm>
-            <a:off x="563316" y="1990414"/>
-            <a:ext cx="6623095" cy="4447464"/>
-          </a:xfrm>
-          <a:prstGeom prst="rect">
-            <a:avLst/>
-          </a:prstGeom>
-          <a:ln>
-            <a:noFill/>
-          </a:ln>
-          <a:effectLst>
-            <a:outerShdw blurRad="292100" dist="139700" dir="2700000" algn="tl" rotWithShape="0">
-              <a:srgbClr val="333333">
-                <a:alpha val="65000"/>
-              </a:srgbClr>
-            </a:outerShdw>
-          </a:effectLst>
-        </p:spPr>
-      </p:pic>
-      <p:pic>
-        <p:nvPicPr>
-          <p:cNvPr id="5" name="Imagem 4"/>
-          <p:cNvPicPr>
-            <a:picLocks noChangeAspect="1"/>
-          </p:cNvPicPr>
-          <p:nvPr/>
-        </p:nvPicPr>
-        <p:blipFill>
-          <a:blip r:embed="rId3"/>
-          <a:stretch>
-            <a:fillRect/>
-          </a:stretch>
-        </p:blipFill>
-        <p:spPr>
-          <a:xfrm>
-            <a:off x="4209713" y="1583417"/>
-            <a:ext cx="7394151" cy="4149236"/>
-          </a:xfrm>
-          <a:prstGeom prst="rect">
-            <a:avLst/>
-          </a:prstGeom>
-          <a:ln>
-            <a:noFill/>
-          </a:ln>
-          <a:effectLst>
-            <a:outerShdw blurRad="292100" dist="139700" dir="2700000" algn="tl" rotWithShape="0">
-              <a:srgbClr val="333333">
-                <a:alpha val="65000"/>
-              </a:srgbClr>
-            </a:outerShdw>
-          </a:effectLst>
-        </p:spPr>
-      </p:pic>
-      <p:sp>
-        <p:nvSpPr>
-          <p:cNvPr id="7" name="Retângulo 6"/>
-          <p:cNvSpPr/>
-          <p:nvPr/>
-        </p:nvSpPr>
-        <p:spPr>
-          <a:xfrm>
-            <a:off x="6425216" y="5958321"/>
-            <a:ext cx="5600700" cy="369332"/>
-          </a:xfrm>
-          <a:prstGeom prst="rect">
-            <a:avLst/>
-          </a:prstGeom>
-        </p:spPr>
-        <p:txBody>
-          <a:bodyPr wrap="none">
-            <a:spAutoFit/>
-          </a:bodyPr>
-          <a:lstStyle/>
-          <a:p>
-            <a:r>
-              <a:rPr lang="pt-BR" dirty="0"/>
-              <a:t>https://github.com/eliasnogueira/selenium-java-evidence</a:t>
-            </a:r>
-          </a:p>
-        </p:txBody>
-      </p:sp>
-    </p:spTree>
-    <p:extLst>
-      <p:ext uri="{BB962C8B-B14F-4D97-AF65-F5344CB8AC3E}">
-        <p14:creationId xmlns:p14="http://schemas.microsoft.com/office/powerpoint/2010/main" val="2453462491"/>
-      </p:ext>
-    </p:extLst>
-  </p:cSld>
-  <p:clrMapOvr>
-    <a:masterClrMapping/>
-  </p:clrMapOvr>
+  <p:timing>
+    <p:tnLst>
+      <p:par>
+        <p:cTn id="1" dur="indefinite" restart="never" nodeType="tmRoot"/>
+      </p:par>
+    </p:tnLst>
+  </p:timing>
 </p:sld>
 </file>
 
@@ -11169,46 +11075,131 @@
       </p:grpSpPr>
       <p:sp>
         <p:nvSpPr>
-          <p:cNvPr id="4" name="Título 3"/>
+          <p:cNvPr id="2" name="Título 1"/>
           <p:cNvSpPr>
             <a:spLocks noGrp="1"/>
           </p:cNvSpPr>
           <p:nvPr>
-            <p:ph type="ctrTitle"/>
+            <p:ph type="title"/>
           </p:nvPr>
         </p:nvSpPr>
         <p:spPr/>
         <p:txBody>
-          <a:bodyPr>
-            <a:normAutofit/>
+          <a:bodyPr/>
+          <a:lstStyle/>
+          <a:p>
+            <a:r>
+              <a:rPr lang="pt-BR" dirty="0" smtClean="0"/>
+              <a:t>Evidências em PDF – </a:t>
+            </a:r>
+            <a:r>
+              <a:rPr lang="pt-BR" dirty="0" err="1" smtClean="0">
+                <a:solidFill>
+                  <a:srgbClr val="FFC000"/>
+                </a:solidFill>
+              </a:rPr>
+              <a:t>selenium-java-evidence</a:t>
+            </a:r>
+            <a:endParaRPr lang="pt-BR" dirty="0">
+              <a:solidFill>
+                <a:srgbClr val="FFC000"/>
+              </a:solidFill>
+            </a:endParaRPr>
+          </a:p>
+        </p:txBody>
+      </p:sp>
+      <p:pic>
+        <p:nvPicPr>
+          <p:cNvPr id="6" name="Imagem 5"/>
+          <p:cNvPicPr>
+            <a:picLocks noChangeAspect="1"/>
+          </p:cNvPicPr>
+          <p:nvPr/>
+        </p:nvPicPr>
+        <p:blipFill>
+          <a:blip r:embed="rId2"/>
+          <a:stretch>
+            <a:fillRect/>
+          </a:stretch>
+        </p:blipFill>
+        <p:spPr>
+          <a:xfrm>
+            <a:off x="563316" y="1990414"/>
+            <a:ext cx="6623095" cy="4447464"/>
+          </a:xfrm>
+          <a:prstGeom prst="rect">
+            <a:avLst/>
+          </a:prstGeom>
+          <a:ln>
+            <a:noFill/>
+          </a:ln>
+          <a:effectLst>
+            <a:outerShdw blurRad="292100" dist="139700" dir="2700000" algn="tl" rotWithShape="0">
+              <a:srgbClr val="333333">
+                <a:alpha val="65000"/>
+              </a:srgbClr>
+            </a:outerShdw>
+          </a:effectLst>
+        </p:spPr>
+      </p:pic>
+      <p:pic>
+        <p:nvPicPr>
+          <p:cNvPr id="5" name="Imagem 4"/>
+          <p:cNvPicPr>
+            <a:picLocks noChangeAspect="1"/>
+          </p:cNvPicPr>
+          <p:nvPr/>
+        </p:nvPicPr>
+        <p:blipFill>
+          <a:blip r:embed="rId3"/>
+          <a:stretch>
+            <a:fillRect/>
+          </a:stretch>
+        </p:blipFill>
+        <p:spPr>
+          <a:xfrm>
+            <a:off x="4209713" y="1583417"/>
+            <a:ext cx="7394151" cy="4149236"/>
+          </a:xfrm>
+          <a:prstGeom prst="rect">
+            <a:avLst/>
+          </a:prstGeom>
+          <a:ln>
+            <a:noFill/>
+          </a:ln>
+          <a:effectLst>
+            <a:outerShdw blurRad="292100" dist="139700" dir="2700000" algn="tl" rotWithShape="0">
+              <a:srgbClr val="333333">
+                <a:alpha val="65000"/>
+              </a:srgbClr>
+            </a:outerShdw>
+          </a:effectLst>
+        </p:spPr>
+      </p:pic>
+      <p:sp>
+        <p:nvSpPr>
+          <p:cNvPr id="7" name="Retângulo 6"/>
+          <p:cNvSpPr/>
+          <p:nvPr/>
+        </p:nvSpPr>
+        <p:spPr>
+          <a:xfrm>
+            <a:off x="6425216" y="5958321"/>
+            <a:ext cx="5600700" cy="369332"/>
+          </a:xfrm>
+          <a:prstGeom prst="rect">
+            <a:avLst/>
+          </a:prstGeom>
+        </p:spPr>
+        <p:txBody>
+          <a:bodyPr wrap="none">
+            <a:spAutoFit/>
           </a:bodyPr>
           <a:lstStyle/>
           <a:p>
             <a:r>
-              <a:rPr lang="pt-BR" sz="2700" dirty="0" smtClean="0">
-                <a:solidFill>
-                  <a:schemeClr val="bg1">
-                    <a:lumMod val="65000"/>
-                  </a:schemeClr>
-                </a:solidFill>
-                <a:latin typeface="Arial Black" panose="020B0A04020102020204" pitchFamily="34" charset="0"/>
-              </a:rPr>
-              <a:t>2.1</a:t>
-            </a:r>
-            <a:r>
-              <a:rPr lang="pt-BR" sz="2200" dirty="0" smtClean="0">
-                <a:solidFill>
-                  <a:schemeClr val="bg1">
-                    <a:lumMod val="65000"/>
-                  </a:schemeClr>
-                </a:solidFill>
-                <a:latin typeface="Arial Black" panose="020B0A04020102020204" pitchFamily="34" charset="0"/>
-              </a:rPr>
-              <a:t> </a:t>
-            </a:r>
-            <a:r>
               <a:rPr lang="pt-BR" dirty="0"/>
-              <a:t>Desafio 2:</a:t>
+              <a:t>https://github.com/eliasnogueira/selenium-java-evidence</a:t>
             </a:r>
           </a:p>
         </p:txBody>
@@ -11216,7 +11207,7 @@
     </p:spTree>
     <p:extLst>
       <p:ext uri="{BB962C8B-B14F-4D97-AF65-F5344CB8AC3E}">
-        <p14:creationId xmlns:p14="http://schemas.microsoft.com/office/powerpoint/2010/main" val="822021620"/>
+        <p14:creationId xmlns:p14="http://schemas.microsoft.com/office/powerpoint/2010/main" val="2453462491"/>
       </p:ext>
     </p:extLst>
   </p:cSld>
@@ -11252,86 +11243,54 @@
       </p:grpSpPr>
       <p:sp>
         <p:nvSpPr>
-          <p:cNvPr id="5" name="Espaço Reservado para Conteúdo 4"/>
+          <p:cNvPr id="4" name="Título 3"/>
           <p:cNvSpPr>
             <a:spLocks noGrp="1"/>
           </p:cNvSpPr>
           <p:nvPr>
-            <p:ph sz="half" idx="1"/>
+            <p:ph type="ctrTitle"/>
           </p:nvPr>
         </p:nvSpPr>
-        <p:spPr>
-          <a:xfrm>
-            <a:off x="464714" y="1825625"/>
-            <a:ext cx="11103172" cy="4351338"/>
-          </a:xfrm>
-        </p:spPr>
+        <p:spPr/>
         <p:txBody>
           <a:bodyPr>
             <a:normAutofit/>
           </a:bodyPr>
           <a:lstStyle/>
           <a:p>
-            <a:pPr marL="457200" indent="-457200">
-              <a:buFont typeface="+mj-lt"/>
-              <a:buAutoNum type="arabicPeriod"/>
-            </a:pPr>
-            <a:r>
-              <a:rPr lang="pt-BR" sz="2800" dirty="0" smtClean="0"/>
-              <a:t>Cenário 1: Efetuar </a:t>
-            </a:r>
-            <a:r>
-              <a:rPr lang="pt-BR" sz="2800" dirty="0" err="1" smtClean="0"/>
-              <a:t>login</a:t>
-            </a:r>
-            <a:endParaRPr lang="pt-BR" sz="2800" dirty="0" smtClean="0"/>
-          </a:p>
-          <a:p>
-            <a:pPr marL="457200" indent="-457200">
-              <a:buFont typeface="+mj-lt"/>
-              <a:buAutoNum type="arabicPeriod"/>
-            </a:pPr>
-            <a:endParaRPr lang="pt-BR" sz="2800" dirty="0" smtClean="0"/>
-          </a:p>
-          <a:p>
-            <a:pPr marL="457200" indent="-457200">
-              <a:buFont typeface="+mj-lt"/>
-              <a:buAutoNum type="arabicPeriod"/>
-            </a:pPr>
-            <a:r>
-              <a:rPr lang="pt-BR" sz="2800" dirty="0" smtClean="0"/>
-              <a:t>Cenário 2: Comprar produto</a:t>
-            </a:r>
-          </a:p>
-        </p:txBody>
-      </p:sp>
-      <p:sp>
-        <p:nvSpPr>
-          <p:cNvPr id="2" name="Título 1"/>
-          <p:cNvSpPr>
-            <a:spLocks noGrp="1"/>
-          </p:cNvSpPr>
-          <p:nvPr>
-            <p:ph type="title"/>
-          </p:nvPr>
-        </p:nvSpPr>
-        <p:spPr/>
-        <p:txBody>
-          <a:bodyPr/>
-          <a:lstStyle/>
-          <a:p>
-            <a:r>
-              <a:rPr lang="pt-BR" dirty="0" smtClean="0"/>
-              <a:t>Desafio 2</a:t>
-            </a:r>
-            <a:endParaRPr lang="pt-BR" dirty="0"/>
+            <a:r>
+              <a:rPr lang="pt-BR" sz="2700" dirty="0" smtClean="0">
+                <a:solidFill>
+                  <a:schemeClr val="bg1">
+                    <a:lumMod val="65000"/>
+                  </a:schemeClr>
+                </a:solidFill>
+                <a:latin typeface="Arial Black" panose="020B0A04020102020204" pitchFamily="34" charset="0"/>
+              </a:rPr>
+              <a:t>2.1</a:t>
+            </a:r>
+            <a:r>
+              <a:rPr lang="pt-BR" sz="2200" dirty="0" smtClean="0">
+                <a:solidFill>
+                  <a:schemeClr val="bg1">
+                    <a:lumMod val="65000"/>
+                  </a:schemeClr>
+                </a:solidFill>
+                <a:latin typeface="Arial Black" panose="020B0A04020102020204" pitchFamily="34" charset="0"/>
+              </a:rPr>
+              <a:t> </a:t>
+            </a:r>
+            <a:r>
+              <a:rPr lang="pt-BR" dirty="0"/>
+              <a:t>Desafio 2:</a:t>
+            </a:r>
           </a:p>
         </p:txBody>
       </p:sp>
     </p:spTree>
     <p:extLst>
       <p:ext uri="{BB962C8B-B14F-4D97-AF65-F5344CB8AC3E}">
-        <p14:creationId xmlns:p14="http://schemas.microsoft.com/office/powerpoint/2010/main" val="3296828839"/>
+        <p14:creationId xmlns:p14="http://schemas.microsoft.com/office/powerpoint/2010/main" val="822021620"/>
       </p:ext>
     </p:extLst>
   </p:cSld>
@@ -11367,6 +11326,121 @@
       </p:grpSpPr>
       <p:sp>
         <p:nvSpPr>
+          <p:cNvPr id="5" name="Espaço Reservado para Conteúdo 4"/>
+          <p:cNvSpPr>
+            <a:spLocks noGrp="1"/>
+          </p:cNvSpPr>
+          <p:nvPr>
+            <p:ph sz="half" idx="1"/>
+          </p:nvPr>
+        </p:nvSpPr>
+        <p:spPr>
+          <a:xfrm>
+            <a:off x="464714" y="1825625"/>
+            <a:ext cx="11103172" cy="4351338"/>
+          </a:xfrm>
+        </p:spPr>
+        <p:txBody>
+          <a:bodyPr>
+            <a:normAutofit/>
+          </a:bodyPr>
+          <a:lstStyle/>
+          <a:p>
+            <a:pPr marL="457200" indent="-457200">
+              <a:buFont typeface="+mj-lt"/>
+              <a:buAutoNum type="arabicPeriod"/>
+            </a:pPr>
+            <a:r>
+              <a:rPr lang="pt-BR" sz="2800" dirty="0" smtClean="0"/>
+              <a:t>Cenário 1: Efetuar </a:t>
+            </a:r>
+            <a:r>
+              <a:rPr lang="pt-BR" sz="2800" dirty="0" err="1" smtClean="0"/>
+              <a:t>login</a:t>
+            </a:r>
+            <a:endParaRPr lang="pt-BR" sz="2800" dirty="0" smtClean="0"/>
+          </a:p>
+          <a:p>
+            <a:pPr marL="457200" indent="-457200">
+              <a:buFont typeface="+mj-lt"/>
+              <a:buAutoNum type="arabicPeriod"/>
+            </a:pPr>
+            <a:endParaRPr lang="pt-BR" sz="2800" dirty="0" smtClean="0"/>
+          </a:p>
+          <a:p>
+            <a:pPr marL="457200" indent="-457200">
+              <a:buFont typeface="+mj-lt"/>
+              <a:buAutoNum type="arabicPeriod"/>
+            </a:pPr>
+            <a:r>
+              <a:rPr lang="pt-BR" sz="2800" dirty="0" smtClean="0"/>
+              <a:t>Cenário 2: Comprar produto</a:t>
+            </a:r>
+          </a:p>
+        </p:txBody>
+      </p:sp>
+      <p:sp>
+        <p:nvSpPr>
+          <p:cNvPr id="2" name="Título 1"/>
+          <p:cNvSpPr>
+            <a:spLocks noGrp="1"/>
+          </p:cNvSpPr>
+          <p:nvPr>
+            <p:ph type="title"/>
+          </p:nvPr>
+        </p:nvSpPr>
+        <p:spPr/>
+        <p:txBody>
+          <a:bodyPr/>
+          <a:lstStyle/>
+          <a:p>
+            <a:r>
+              <a:rPr lang="pt-BR" dirty="0" smtClean="0"/>
+              <a:t>Desafio 2</a:t>
+            </a:r>
+            <a:endParaRPr lang="pt-BR" dirty="0"/>
+          </a:p>
+        </p:txBody>
+      </p:sp>
+    </p:spTree>
+    <p:extLst>
+      <p:ext uri="{BB962C8B-B14F-4D97-AF65-F5344CB8AC3E}">
+        <p14:creationId xmlns:p14="http://schemas.microsoft.com/office/powerpoint/2010/main" val="3296828839"/>
+      </p:ext>
+    </p:extLst>
+  </p:cSld>
+  <p:clrMapOvr>
+    <a:masterClrMapping/>
+  </p:clrMapOvr>
+  <p:timing>
+    <p:tnLst>
+      <p:par>
+        <p:cTn id="1" dur="indefinite" restart="never" nodeType="tmRoot"/>
+      </p:par>
+    </p:tnLst>
+  </p:timing>
+</p:sld>
+</file>
+
+<file path=ppt/slides/slide47.xml><?xml version="1.0" encoding="utf-8"?>
+<p:sld xmlns:a="http://schemas.openxmlformats.org/drawingml/2006/main" xmlns:r="http://schemas.openxmlformats.org/officeDocument/2006/relationships" xmlns:p="http://schemas.openxmlformats.org/presentationml/2006/main">
+  <p:cSld>
+    <p:spTree>
+      <p:nvGrpSpPr>
+        <p:cNvPr id="1" name=""/>
+        <p:cNvGrpSpPr/>
+        <p:nvPr/>
+      </p:nvGrpSpPr>
+      <p:grpSpPr>
+        <a:xfrm>
+          <a:off x="0" y="0"/>
+          <a:ext cx="0" cy="0"/>
+          <a:chOff x="0" y="0"/>
+          <a:chExt cx="0" cy="0"/>
+        </a:xfrm>
+      </p:grpSpPr>
+      <p:sp>
+        <p:nvSpPr>
           <p:cNvPr id="4" name="Título 3"/>
           <p:cNvSpPr>
             <a:spLocks noGrp="1"/>
@@ -11868,7 +11942,7 @@
 </p:sld>
 </file>
 
-<file path=ppt/slides/slide47.xml><?xml version="1.0" encoding="utf-8"?>
+<file path=ppt/slides/slide48.xml><?xml version="1.0" encoding="utf-8"?>
 <p:sld xmlns:a="http://schemas.openxmlformats.org/drawingml/2006/main" xmlns:r="http://schemas.openxmlformats.org/officeDocument/2006/relationships" xmlns:p="http://schemas.openxmlformats.org/presentationml/2006/main">
   <p:cSld>
     <p:spTree>
@@ -13004,18 +13078,7 @@
                 </a:solidFill>
                 <a:latin typeface="Arial Black" panose="020B0A04020102020204" pitchFamily="34" charset="0"/>
               </a:rPr>
-              <a:t>0.2</a:t>
-            </a:r>
-            <a:r>
-              <a:rPr lang="pt-BR" sz="2400" dirty="0" smtClean="0">
-                <a:solidFill>
-                  <a:schemeClr val="bg1">
-                    <a:lumMod val="65000"/>
-                  </a:schemeClr>
-                </a:solidFill>
-                <a:latin typeface="Arial Black" panose="020B0A04020102020204" pitchFamily="34" charset="0"/>
-              </a:rPr>
-              <a:t>.</a:t>
+              <a:t>0.2.</a:t>
             </a:r>
             <a:r>
               <a:rPr lang="pt-BR" sz="2200" dirty="0" smtClean="0">
@@ -13392,18 +13455,7 @@
                 </a:solidFill>
                 <a:latin typeface="Arial Black" panose="020B0A04020102020204" pitchFamily="34" charset="0"/>
               </a:rPr>
-              <a:t>0.3</a:t>
-            </a:r>
-            <a:r>
-              <a:rPr lang="pt-BR" sz="2400" dirty="0" smtClean="0">
-                <a:solidFill>
-                  <a:schemeClr val="bg1">
-                    <a:lumMod val="65000"/>
-                  </a:schemeClr>
-                </a:solidFill>
-                <a:latin typeface="Arial Black" panose="020B0A04020102020204" pitchFamily="34" charset="0"/>
-              </a:rPr>
-              <a:t>.</a:t>
+              <a:t>0.3.</a:t>
             </a:r>
             <a:r>
               <a:rPr lang="pt-BR" sz="2200" dirty="0" smtClean="0">

</xml_diff>